<commit_message>
PPT updated with Data Exploration phase
</commit_message>
<xml_diff>
--- a/Data and Web Mining CA Presentation Madsen Finnegan cf v1-0 260120.pptx
+++ b/Data and Web Mining CA Presentation Madsen Finnegan cf v1-0 260120.pptx
@@ -166,8 +166,8 @@
           </a:prstGeom>
           <a:noFill/>
           <a:extLst>
-            <a:ext uri="{909E8E84-426E-40dd-AFC4-6F175D3DCCD1}">
-              <a14:hiddenFill xmlns:a14="http://schemas.microsoft.com/office/drawing/2010/main" xmlns="">
+            <a:ext uri="{909E8E84-426E-40DD-AFC4-6F175D3DCCD1}">
+              <a14:hiddenFill xmlns:a14="http://schemas.microsoft.com/office/drawing/2010/main">
                 <a:solidFill>
                   <a:srgbClr val="FFFFFF"/>
                 </a:solidFill>
@@ -226,8 +226,8 @@
               <a:noFill/>
             </a:ln>
             <a:extLst>
-              <a:ext uri="{91240B29-F687-4f45-9708-019B960494DF}">
-                <a14:hiddenLine xmlns:a14="http://schemas.microsoft.com/office/drawing/2010/main" xmlns="" w="9525">
+              <a:ext uri="{91240B29-F687-4F45-9708-019B960494DF}">
+                <a14:hiddenLine xmlns:a14="http://schemas.microsoft.com/office/drawing/2010/main" w="9525">
                   <a:solidFill>
                     <a:srgbClr val="000000"/>
                   </a:solidFill>
@@ -316,8 +316,8 @@
               <a:noFill/>
             </a:ln>
             <a:extLst>
-              <a:ext uri="{91240B29-F687-4f45-9708-019B960494DF}">
-                <a14:hiddenLine xmlns:a14="http://schemas.microsoft.com/office/drawing/2010/main" xmlns="" w="9525">
+              <a:ext uri="{91240B29-F687-4F45-9708-019B960494DF}">
+                <a14:hiddenLine xmlns:a14="http://schemas.microsoft.com/office/drawing/2010/main" w="9525">
                   <a:solidFill>
                     <a:srgbClr val="000000"/>
                   </a:solidFill>
@@ -406,8 +406,8 @@
               <a:noFill/>
             </a:ln>
             <a:extLst>
-              <a:ext uri="{91240B29-F687-4f45-9708-019B960494DF}">
-                <a14:hiddenLine xmlns:a14="http://schemas.microsoft.com/office/drawing/2010/main" xmlns="" w="9525">
+              <a:ext uri="{91240B29-F687-4F45-9708-019B960494DF}">
+                <a14:hiddenLine xmlns:a14="http://schemas.microsoft.com/office/drawing/2010/main" w="9525">
                   <a:solidFill>
                     <a:srgbClr val="000000"/>
                   </a:solidFill>
@@ -440,8 +440,8 @@
               <a:noFill/>
             </a:ln>
             <a:extLst>
-              <a:ext uri="{91240B29-F687-4f45-9708-019B960494DF}">
-                <a14:hiddenLine xmlns:a14="http://schemas.microsoft.com/office/drawing/2010/main" xmlns="" w="9525">
+              <a:ext uri="{91240B29-F687-4F45-9708-019B960494DF}">
+                <a14:hiddenLine xmlns:a14="http://schemas.microsoft.com/office/drawing/2010/main" w="9525">
                   <a:solidFill>
                     <a:srgbClr val="000000"/>
                   </a:solidFill>
@@ -530,8 +530,8 @@
               <a:noFill/>
             </a:ln>
             <a:extLst>
-              <a:ext uri="{91240B29-F687-4f45-9708-019B960494DF}">
-                <a14:hiddenLine xmlns:a14="http://schemas.microsoft.com/office/drawing/2010/main" xmlns="" w="9525">
+              <a:ext uri="{91240B29-F687-4F45-9708-019B960494DF}">
+                <a14:hiddenLine xmlns:a14="http://schemas.microsoft.com/office/drawing/2010/main" w="9525">
                   <a:solidFill>
                     <a:srgbClr val="000000"/>
                   </a:solidFill>
@@ -592,8 +592,8 @@
               <a:noFill/>
             </a:ln>
             <a:extLst>
-              <a:ext uri="{91240B29-F687-4f45-9708-019B960494DF}">
-                <a14:hiddenLine xmlns:a14="http://schemas.microsoft.com/office/drawing/2010/main" xmlns="" w="9525">
+              <a:ext uri="{91240B29-F687-4F45-9708-019B960494DF}">
+                <a14:hiddenLine xmlns:a14="http://schemas.microsoft.com/office/drawing/2010/main" w="9525">
                   <a:solidFill>
                     <a:srgbClr val="000000"/>
                   </a:solidFill>
@@ -654,8 +654,8 @@
               <a:noFill/>
             </a:ln>
             <a:extLst>
-              <a:ext uri="{91240B29-F687-4f45-9708-019B960494DF}">
-                <a14:hiddenLine xmlns:a14="http://schemas.microsoft.com/office/drawing/2010/main" xmlns="" w="9525">
+              <a:ext uri="{91240B29-F687-4F45-9708-019B960494DF}">
+                <a14:hiddenLine xmlns:a14="http://schemas.microsoft.com/office/drawing/2010/main" w="9525">
                   <a:solidFill>
                     <a:srgbClr val="000000"/>
                   </a:solidFill>
@@ -744,8 +744,8 @@
               <a:noFill/>
             </a:ln>
             <a:extLst>
-              <a:ext uri="{91240B29-F687-4f45-9708-019B960494DF}">
-                <a14:hiddenLine xmlns:a14="http://schemas.microsoft.com/office/drawing/2010/main" xmlns="" w="9525">
+              <a:ext uri="{91240B29-F687-4F45-9708-019B960494DF}">
+                <a14:hiddenLine xmlns:a14="http://schemas.microsoft.com/office/drawing/2010/main" w="9525">
                   <a:solidFill>
                     <a:srgbClr val="000000"/>
                   </a:solidFill>
@@ -806,8 +806,8 @@
               <a:noFill/>
             </a:ln>
             <a:extLst>
-              <a:ext uri="{91240B29-F687-4f45-9708-019B960494DF}">
-                <a14:hiddenLine xmlns:a14="http://schemas.microsoft.com/office/drawing/2010/main" xmlns="" w="9525">
+              <a:ext uri="{91240B29-F687-4F45-9708-019B960494DF}">
+                <a14:hiddenLine xmlns:a14="http://schemas.microsoft.com/office/drawing/2010/main" w="9525">
                   <a:solidFill>
                     <a:srgbClr val="000000"/>
                   </a:solidFill>
@@ -868,8 +868,8 @@
               <a:noFill/>
             </a:ln>
             <a:extLst>
-              <a:ext uri="{91240B29-F687-4f45-9708-019B960494DF}">
-                <a14:hiddenLine xmlns:a14="http://schemas.microsoft.com/office/drawing/2010/main" xmlns="" w="9525">
+              <a:ext uri="{91240B29-F687-4F45-9708-019B960494DF}">
+                <a14:hiddenLine xmlns:a14="http://schemas.microsoft.com/office/drawing/2010/main" w="9525">
                   <a:solidFill>
                     <a:srgbClr val="000000"/>
                   </a:solidFill>
@@ -958,8 +958,8 @@
               <a:noFill/>
             </a:ln>
             <a:extLst>
-              <a:ext uri="{91240B29-F687-4f45-9708-019B960494DF}">
-                <a14:hiddenLine xmlns:a14="http://schemas.microsoft.com/office/drawing/2010/main" xmlns="" w="9525">
+              <a:ext uri="{91240B29-F687-4F45-9708-019B960494DF}">
+                <a14:hiddenLine xmlns:a14="http://schemas.microsoft.com/office/drawing/2010/main" w="9525">
                   <a:solidFill>
                     <a:srgbClr val="000000"/>
                   </a:solidFill>
@@ -1048,8 +1048,8 @@
               <a:noFill/>
             </a:ln>
             <a:extLst>
-              <a:ext uri="{91240B29-F687-4f45-9708-019B960494DF}">
-                <a14:hiddenLine xmlns:a14="http://schemas.microsoft.com/office/drawing/2010/main" xmlns="" w="9525">
+              <a:ext uri="{91240B29-F687-4F45-9708-019B960494DF}">
+                <a14:hiddenLine xmlns:a14="http://schemas.microsoft.com/office/drawing/2010/main" w="9525">
                   <a:solidFill>
                     <a:srgbClr val="000000"/>
                   </a:solidFill>
@@ -1110,8 +1110,8 @@
               <a:noFill/>
             </a:ln>
             <a:extLst>
-              <a:ext uri="{91240B29-F687-4f45-9708-019B960494DF}">
-                <a14:hiddenLine xmlns:a14="http://schemas.microsoft.com/office/drawing/2010/main" xmlns="" w="9525">
+              <a:ext uri="{91240B29-F687-4F45-9708-019B960494DF}">
+                <a14:hiddenLine xmlns:a14="http://schemas.microsoft.com/office/drawing/2010/main" w="9525">
                   <a:solidFill>
                     <a:srgbClr val="000000"/>
                   </a:solidFill>
@@ -1220,8 +1220,8 @@
               <a:noFill/>
             </a:ln>
             <a:extLst>
-              <a:ext uri="{91240B29-F687-4f45-9708-019B960494DF}">
-                <a14:hiddenLine xmlns:a14="http://schemas.microsoft.com/office/drawing/2010/main" xmlns="" w="9525">
+              <a:ext uri="{91240B29-F687-4F45-9708-019B960494DF}">
+                <a14:hiddenLine xmlns:a14="http://schemas.microsoft.com/office/drawing/2010/main" w="9525">
                   <a:solidFill>
                     <a:srgbClr val="000000"/>
                   </a:solidFill>
@@ -1282,8 +1282,8 @@
               <a:noFill/>
             </a:ln>
             <a:extLst>
-              <a:ext uri="{91240B29-F687-4f45-9708-019B960494DF}">
-                <a14:hiddenLine xmlns:a14="http://schemas.microsoft.com/office/drawing/2010/main" xmlns="" w="9525">
+              <a:ext uri="{91240B29-F687-4F45-9708-019B960494DF}">
+                <a14:hiddenLine xmlns:a14="http://schemas.microsoft.com/office/drawing/2010/main" w="9525">
                   <a:solidFill>
                     <a:srgbClr val="000000"/>
                   </a:solidFill>
@@ -1372,8 +1372,8 @@
               <a:noFill/>
             </a:ln>
             <a:extLst>
-              <a:ext uri="{91240B29-F687-4f45-9708-019B960494DF}">
-                <a14:hiddenLine xmlns:a14="http://schemas.microsoft.com/office/drawing/2010/main" xmlns="" w="9525">
+              <a:ext uri="{91240B29-F687-4F45-9708-019B960494DF}">
+                <a14:hiddenLine xmlns:a14="http://schemas.microsoft.com/office/drawing/2010/main" w="9525">
                   <a:solidFill>
                     <a:srgbClr val="000000"/>
                   </a:solidFill>
@@ -1462,8 +1462,8 @@
               <a:noFill/>
             </a:ln>
             <a:extLst>
-              <a:ext uri="{91240B29-F687-4f45-9708-019B960494DF}">
-                <a14:hiddenLine xmlns:a14="http://schemas.microsoft.com/office/drawing/2010/main" xmlns="" w="9525">
+              <a:ext uri="{91240B29-F687-4F45-9708-019B960494DF}">
+                <a14:hiddenLine xmlns:a14="http://schemas.microsoft.com/office/drawing/2010/main" w="9525">
                   <a:solidFill>
                     <a:srgbClr val="000000"/>
                   </a:solidFill>
@@ -1524,8 +1524,8 @@
               <a:noFill/>
             </a:ln>
             <a:extLst>
-              <a:ext uri="{91240B29-F687-4f45-9708-019B960494DF}">
-                <a14:hiddenLine xmlns:a14="http://schemas.microsoft.com/office/drawing/2010/main" xmlns="" w="9525">
+              <a:ext uri="{91240B29-F687-4F45-9708-019B960494DF}">
+                <a14:hiddenLine xmlns:a14="http://schemas.microsoft.com/office/drawing/2010/main" w="9525">
                   <a:solidFill>
                     <a:srgbClr val="000000"/>
                   </a:solidFill>
@@ -1614,8 +1614,8 @@
               <a:noFill/>
             </a:ln>
             <a:extLst>
-              <a:ext uri="{91240B29-F687-4f45-9708-019B960494DF}">
-                <a14:hiddenLine xmlns:a14="http://schemas.microsoft.com/office/drawing/2010/main" xmlns="" w="9525">
+              <a:ext uri="{91240B29-F687-4F45-9708-019B960494DF}">
+                <a14:hiddenLine xmlns:a14="http://schemas.microsoft.com/office/drawing/2010/main" w="9525">
                   <a:solidFill>
                     <a:srgbClr val="000000"/>
                   </a:solidFill>
@@ -1704,8 +1704,8 @@
               <a:noFill/>
             </a:ln>
             <a:extLst>
-              <a:ext uri="{91240B29-F687-4f45-9708-019B960494DF}">
-                <a14:hiddenLine xmlns:a14="http://schemas.microsoft.com/office/drawing/2010/main" xmlns="" w="9525">
+              <a:ext uri="{91240B29-F687-4F45-9708-019B960494DF}">
+                <a14:hiddenLine xmlns:a14="http://schemas.microsoft.com/office/drawing/2010/main" w="9525">
                   <a:solidFill>
                     <a:srgbClr val="000000"/>
                   </a:solidFill>
@@ -1760,8 +1760,8 @@
               <a:noFill/>
             </a:ln>
             <a:extLst>
-              <a:ext uri="{91240B29-F687-4f45-9708-019B960494DF}">
-                <a14:hiddenLine xmlns:a14="http://schemas.microsoft.com/office/drawing/2010/main" xmlns="" w="9525">
+              <a:ext uri="{91240B29-F687-4F45-9708-019B960494DF}">
+                <a14:hiddenLine xmlns:a14="http://schemas.microsoft.com/office/drawing/2010/main" w="9525">
                   <a:solidFill>
                     <a:srgbClr val="000000"/>
                   </a:solidFill>
@@ -1850,8 +1850,8 @@
               <a:noFill/>
             </a:ln>
             <a:extLst>
-              <a:ext uri="{91240B29-F687-4f45-9708-019B960494DF}">
-                <a14:hiddenLine xmlns:a14="http://schemas.microsoft.com/office/drawing/2010/main" xmlns="" w="9525">
+              <a:ext uri="{91240B29-F687-4F45-9708-019B960494DF}">
+                <a14:hiddenLine xmlns:a14="http://schemas.microsoft.com/office/drawing/2010/main" w="9525">
                   <a:solidFill>
                     <a:srgbClr val="000000"/>
                   </a:solidFill>
@@ -1906,8 +1906,8 @@
               <a:noFill/>
             </a:ln>
             <a:extLst>
-              <a:ext uri="{91240B29-F687-4f45-9708-019B960494DF}">
-                <a14:hiddenLine xmlns:a14="http://schemas.microsoft.com/office/drawing/2010/main" xmlns="" w="9525">
+              <a:ext uri="{91240B29-F687-4F45-9708-019B960494DF}">
+                <a14:hiddenLine xmlns:a14="http://schemas.microsoft.com/office/drawing/2010/main" w="9525">
                   <a:solidFill>
                     <a:srgbClr val="000000"/>
                   </a:solidFill>
@@ -1996,8 +1996,8 @@
               <a:noFill/>
             </a:ln>
             <a:extLst>
-              <a:ext uri="{91240B29-F687-4f45-9708-019B960494DF}">
-                <a14:hiddenLine xmlns:a14="http://schemas.microsoft.com/office/drawing/2010/main" xmlns="" w="9525">
+              <a:ext uri="{91240B29-F687-4F45-9708-019B960494DF}">
+                <a14:hiddenLine xmlns:a14="http://schemas.microsoft.com/office/drawing/2010/main" w="9525">
                   <a:solidFill>
                     <a:srgbClr val="000000"/>
                   </a:solidFill>
@@ -2064,8 +2064,8 @@
               <a:noFill/>
             </a:ln>
             <a:extLst>
-              <a:ext uri="{91240B29-F687-4f45-9708-019B960494DF}">
-                <a14:hiddenLine xmlns:a14="http://schemas.microsoft.com/office/drawing/2010/main" xmlns="" w="9525">
+              <a:ext uri="{91240B29-F687-4F45-9708-019B960494DF}">
+                <a14:hiddenLine xmlns:a14="http://schemas.microsoft.com/office/drawing/2010/main" w="9525">
                   <a:solidFill>
                     <a:srgbClr val="000000"/>
                   </a:solidFill>
@@ -2154,8 +2154,8 @@
               <a:noFill/>
             </a:ln>
             <a:extLst>
-              <a:ext uri="{91240B29-F687-4f45-9708-019B960494DF}">
-                <a14:hiddenLine xmlns:a14="http://schemas.microsoft.com/office/drawing/2010/main" xmlns="" w="9525">
+              <a:ext uri="{91240B29-F687-4F45-9708-019B960494DF}">
+                <a14:hiddenLine xmlns:a14="http://schemas.microsoft.com/office/drawing/2010/main" w="9525">
                   <a:solidFill>
                     <a:srgbClr val="000000"/>
                   </a:solidFill>
@@ -2222,8 +2222,8 @@
               <a:noFill/>
             </a:ln>
             <a:extLst>
-              <a:ext uri="{91240B29-F687-4f45-9708-019B960494DF}">
-                <a14:hiddenLine xmlns:a14="http://schemas.microsoft.com/office/drawing/2010/main" xmlns="" w="9525">
+              <a:ext uri="{91240B29-F687-4F45-9708-019B960494DF}">
+                <a14:hiddenLine xmlns:a14="http://schemas.microsoft.com/office/drawing/2010/main" w="9525">
                   <a:solidFill>
                     <a:srgbClr val="000000"/>
                   </a:solidFill>
@@ -2312,8 +2312,8 @@
               <a:noFill/>
             </a:ln>
             <a:extLst>
-              <a:ext uri="{91240B29-F687-4f45-9708-019B960494DF}">
-                <a14:hiddenLine xmlns:a14="http://schemas.microsoft.com/office/drawing/2010/main" xmlns="" w="9525">
+              <a:ext uri="{91240B29-F687-4F45-9708-019B960494DF}">
+                <a14:hiddenLine xmlns:a14="http://schemas.microsoft.com/office/drawing/2010/main" w="9525">
                   <a:solidFill>
                     <a:srgbClr val="000000"/>
                   </a:solidFill>
@@ -2346,8 +2346,8 @@
               <a:noFill/>
             </a:ln>
             <a:extLst>
-              <a:ext uri="{91240B29-F687-4f45-9708-019B960494DF}">
-                <a14:hiddenLine xmlns:a14="http://schemas.microsoft.com/office/drawing/2010/main" xmlns="" w="9525">
+              <a:ext uri="{91240B29-F687-4F45-9708-019B960494DF}">
+                <a14:hiddenLine xmlns:a14="http://schemas.microsoft.com/office/drawing/2010/main" w="9525">
                   <a:solidFill>
                     <a:srgbClr val="000000"/>
                   </a:solidFill>
@@ -2436,8 +2436,8 @@
               <a:noFill/>
             </a:ln>
             <a:extLst>
-              <a:ext uri="{91240B29-F687-4f45-9708-019B960494DF}">
-                <a14:hiddenLine xmlns:a14="http://schemas.microsoft.com/office/drawing/2010/main" xmlns="" w="9525">
+              <a:ext uri="{91240B29-F687-4F45-9708-019B960494DF}">
+                <a14:hiddenLine xmlns:a14="http://schemas.microsoft.com/office/drawing/2010/main" w="9525">
                   <a:solidFill>
                     <a:srgbClr val="000000"/>
                   </a:solidFill>
@@ -2498,8 +2498,8 @@
               <a:noFill/>
             </a:ln>
             <a:extLst>
-              <a:ext uri="{91240B29-F687-4f45-9708-019B960494DF}">
-                <a14:hiddenLine xmlns:a14="http://schemas.microsoft.com/office/drawing/2010/main" xmlns="" w="9525">
+              <a:ext uri="{91240B29-F687-4F45-9708-019B960494DF}">
+                <a14:hiddenLine xmlns:a14="http://schemas.microsoft.com/office/drawing/2010/main" w="9525">
                   <a:solidFill>
                     <a:srgbClr val="000000"/>
                   </a:solidFill>
@@ -2560,8 +2560,8 @@
               <a:noFill/>
             </a:ln>
             <a:extLst>
-              <a:ext uri="{91240B29-F687-4f45-9708-019B960494DF}">
-                <a14:hiddenLine xmlns:a14="http://schemas.microsoft.com/office/drawing/2010/main" xmlns="" w="9525">
+              <a:ext uri="{91240B29-F687-4F45-9708-019B960494DF}">
+                <a14:hiddenLine xmlns:a14="http://schemas.microsoft.com/office/drawing/2010/main" w="9525">
                   <a:solidFill>
                     <a:srgbClr val="000000"/>
                   </a:solidFill>
@@ -2650,8 +2650,8 @@
               <a:noFill/>
             </a:ln>
             <a:extLst>
-              <a:ext uri="{91240B29-F687-4f45-9708-019B960494DF}">
-                <a14:hiddenLine xmlns:a14="http://schemas.microsoft.com/office/drawing/2010/main" xmlns="" w="9525">
+              <a:ext uri="{91240B29-F687-4F45-9708-019B960494DF}">
+                <a14:hiddenLine xmlns:a14="http://schemas.microsoft.com/office/drawing/2010/main" w="9525">
                   <a:solidFill>
                     <a:srgbClr val="000000"/>
                   </a:solidFill>
@@ -2718,8 +2718,8 @@
               <a:noFill/>
             </a:ln>
             <a:extLst>
-              <a:ext uri="{91240B29-F687-4f45-9708-019B960494DF}">
-                <a14:hiddenLine xmlns:a14="http://schemas.microsoft.com/office/drawing/2010/main" xmlns="" w="9525">
+              <a:ext uri="{91240B29-F687-4F45-9708-019B960494DF}">
+                <a14:hiddenLine xmlns:a14="http://schemas.microsoft.com/office/drawing/2010/main" w="9525">
                   <a:solidFill>
                     <a:srgbClr val="000000"/>
                   </a:solidFill>
@@ -2780,8 +2780,8 @@
               <a:noFill/>
             </a:ln>
             <a:extLst>
-              <a:ext uri="{91240B29-F687-4f45-9708-019B960494DF}">
-                <a14:hiddenLine xmlns:a14="http://schemas.microsoft.com/office/drawing/2010/main" xmlns="" w="9525">
+              <a:ext uri="{91240B29-F687-4F45-9708-019B960494DF}">
+                <a14:hiddenLine xmlns:a14="http://schemas.microsoft.com/office/drawing/2010/main" w="9525">
                   <a:solidFill>
                     <a:srgbClr val="000000"/>
                   </a:solidFill>
@@ -2870,8 +2870,8 @@
               <a:noFill/>
             </a:ln>
             <a:extLst>
-              <a:ext uri="{91240B29-F687-4f45-9708-019B960494DF}">
-                <a14:hiddenLine xmlns:a14="http://schemas.microsoft.com/office/drawing/2010/main" xmlns="" w="9525">
+              <a:ext uri="{91240B29-F687-4F45-9708-019B960494DF}">
+                <a14:hiddenLine xmlns:a14="http://schemas.microsoft.com/office/drawing/2010/main" w="9525">
                   <a:solidFill>
                     <a:srgbClr val="000000"/>
                   </a:solidFill>
@@ -2932,8 +2932,8 @@
               <a:noFill/>
             </a:ln>
             <a:extLst>
-              <a:ext uri="{91240B29-F687-4f45-9708-019B960494DF}">
-                <a14:hiddenLine xmlns:a14="http://schemas.microsoft.com/office/drawing/2010/main" xmlns="" w="9525">
+              <a:ext uri="{91240B29-F687-4F45-9708-019B960494DF}">
+                <a14:hiddenLine xmlns:a14="http://schemas.microsoft.com/office/drawing/2010/main" w="9525">
                   <a:solidFill>
                     <a:srgbClr val="000000"/>
                   </a:solidFill>
@@ -3022,8 +3022,8 @@
               <a:noFill/>
             </a:ln>
             <a:extLst>
-              <a:ext uri="{91240B29-F687-4f45-9708-019B960494DF}">
-                <a14:hiddenLine xmlns:a14="http://schemas.microsoft.com/office/drawing/2010/main" xmlns="" w="9525">
+              <a:ext uri="{91240B29-F687-4F45-9708-019B960494DF}">
+                <a14:hiddenLine xmlns:a14="http://schemas.microsoft.com/office/drawing/2010/main" w="9525">
                   <a:solidFill>
                     <a:srgbClr val="000000"/>
                   </a:solidFill>
@@ -3084,8 +3084,8 @@
               <a:noFill/>
             </a:ln>
             <a:extLst>
-              <a:ext uri="{91240B29-F687-4f45-9708-019B960494DF}">
-                <a14:hiddenLine xmlns:a14="http://schemas.microsoft.com/office/drawing/2010/main" xmlns="" w="9525">
+              <a:ext uri="{91240B29-F687-4F45-9708-019B960494DF}">
+                <a14:hiddenLine xmlns:a14="http://schemas.microsoft.com/office/drawing/2010/main" w="9525">
                   <a:solidFill>
                     <a:srgbClr val="000000"/>
                   </a:solidFill>
@@ -3174,8 +3174,8 @@
               <a:noFill/>
             </a:ln>
             <a:extLst>
-              <a:ext uri="{91240B29-F687-4f45-9708-019B960494DF}">
-                <a14:hiddenLine xmlns:a14="http://schemas.microsoft.com/office/drawing/2010/main" xmlns="" w="9525">
+              <a:ext uri="{91240B29-F687-4F45-9708-019B960494DF}">
+                <a14:hiddenLine xmlns:a14="http://schemas.microsoft.com/office/drawing/2010/main" w="9525">
                   <a:solidFill>
                     <a:srgbClr val="000000"/>
                   </a:solidFill>
@@ -3208,8 +3208,8 @@
               <a:noFill/>
             </a:ln>
             <a:extLst>
-              <a:ext uri="{91240B29-F687-4f45-9708-019B960494DF}">
-                <a14:hiddenLine xmlns:a14="http://schemas.microsoft.com/office/drawing/2010/main" xmlns="" w="9525">
+              <a:ext uri="{91240B29-F687-4F45-9708-019B960494DF}">
+                <a14:hiddenLine xmlns:a14="http://schemas.microsoft.com/office/drawing/2010/main" w="9525">
                   <a:solidFill>
                     <a:srgbClr val="000000"/>
                   </a:solidFill>
@@ -3273,8 +3273,8 @@
               <a:noFill/>
             </a:ln>
             <a:extLst>
-              <a:ext uri="{91240B29-F687-4f45-9708-019B960494DF}">
-                <a14:hiddenLine xmlns:a14="http://schemas.microsoft.com/office/drawing/2010/main" xmlns="" w="9525">
+              <a:ext uri="{91240B29-F687-4F45-9708-019B960494DF}">
+                <a14:hiddenLine xmlns:a14="http://schemas.microsoft.com/office/drawing/2010/main" w="9525">
                   <a:solidFill>
                     <a:srgbClr val="000000"/>
                   </a:solidFill>
@@ -3363,8 +3363,8 @@
               <a:noFill/>
             </a:ln>
             <a:extLst>
-              <a:ext uri="{91240B29-F687-4f45-9708-019B960494DF}">
-                <a14:hiddenLine xmlns:a14="http://schemas.microsoft.com/office/drawing/2010/main" xmlns="" w="9525">
+              <a:ext uri="{91240B29-F687-4F45-9708-019B960494DF}">
+                <a14:hiddenLine xmlns:a14="http://schemas.microsoft.com/office/drawing/2010/main" w="9525">
                   <a:solidFill>
                     <a:srgbClr val="000000"/>
                   </a:solidFill>
@@ -3425,8 +3425,8 @@
               <a:noFill/>
             </a:ln>
             <a:extLst>
-              <a:ext uri="{91240B29-F687-4f45-9708-019B960494DF}">
-                <a14:hiddenLine xmlns:a14="http://schemas.microsoft.com/office/drawing/2010/main" xmlns="" w="9525">
+              <a:ext uri="{91240B29-F687-4F45-9708-019B960494DF}">
+                <a14:hiddenLine xmlns:a14="http://schemas.microsoft.com/office/drawing/2010/main" w="9525">
                   <a:solidFill>
                     <a:srgbClr val="000000"/>
                   </a:solidFill>
@@ -3515,8 +3515,8 @@
               <a:noFill/>
             </a:ln>
             <a:extLst>
-              <a:ext uri="{91240B29-F687-4f45-9708-019B960494DF}">
-                <a14:hiddenLine xmlns:a14="http://schemas.microsoft.com/office/drawing/2010/main" xmlns="" w="9525">
+              <a:ext uri="{91240B29-F687-4F45-9708-019B960494DF}">
+                <a14:hiddenLine xmlns:a14="http://schemas.microsoft.com/office/drawing/2010/main" w="9525">
                   <a:solidFill>
                     <a:srgbClr val="000000"/>
                   </a:solidFill>
@@ -3605,8 +3605,8 @@
               <a:noFill/>
             </a:ln>
             <a:extLst>
-              <a:ext uri="{91240B29-F687-4f45-9708-019B960494DF}">
-                <a14:hiddenLine xmlns:a14="http://schemas.microsoft.com/office/drawing/2010/main" xmlns="" w="9525">
+              <a:ext uri="{91240B29-F687-4F45-9708-019B960494DF}">
+                <a14:hiddenLine xmlns:a14="http://schemas.microsoft.com/office/drawing/2010/main" w="9525">
                   <a:solidFill>
                     <a:srgbClr val="000000"/>
                   </a:solidFill>
@@ -3670,8 +3670,8 @@
               <a:noFill/>
             </a:ln>
             <a:extLst>
-              <a:ext uri="{91240B29-F687-4f45-9708-019B960494DF}">
-                <a14:hiddenLine xmlns:a14="http://schemas.microsoft.com/office/drawing/2010/main" xmlns="" w="9525">
+              <a:ext uri="{91240B29-F687-4F45-9708-019B960494DF}">
+                <a14:hiddenLine xmlns:a14="http://schemas.microsoft.com/office/drawing/2010/main" w="9525">
                   <a:solidFill>
                     <a:srgbClr val="000000"/>
                   </a:solidFill>
@@ -3732,8 +3732,8 @@
               <a:noFill/>
             </a:ln>
             <a:extLst>
-              <a:ext uri="{91240B29-F687-4f45-9708-019B960494DF}">
-                <a14:hiddenLine xmlns:a14="http://schemas.microsoft.com/office/drawing/2010/main" xmlns="" w="9525">
+              <a:ext uri="{91240B29-F687-4F45-9708-019B960494DF}">
+                <a14:hiddenLine xmlns:a14="http://schemas.microsoft.com/office/drawing/2010/main" w="9525">
                   <a:solidFill>
                     <a:srgbClr val="000000"/>
                   </a:solidFill>
@@ -3822,8 +3822,8 @@
               <a:noFill/>
             </a:ln>
             <a:extLst>
-              <a:ext uri="{91240B29-F687-4f45-9708-019B960494DF}">
-                <a14:hiddenLine xmlns:a14="http://schemas.microsoft.com/office/drawing/2010/main" xmlns="" w="9525">
+              <a:ext uri="{91240B29-F687-4F45-9708-019B960494DF}">
+                <a14:hiddenLine xmlns:a14="http://schemas.microsoft.com/office/drawing/2010/main" w="9525">
                   <a:solidFill>
                     <a:srgbClr val="000000"/>
                   </a:solidFill>
@@ -3912,8 +3912,8 @@
               <a:noFill/>
             </a:ln>
             <a:extLst>
-              <a:ext uri="{91240B29-F687-4f45-9708-019B960494DF}">
-                <a14:hiddenLine xmlns:a14="http://schemas.microsoft.com/office/drawing/2010/main" xmlns="" w="9525">
+              <a:ext uri="{91240B29-F687-4F45-9708-019B960494DF}">
+                <a14:hiddenLine xmlns:a14="http://schemas.microsoft.com/office/drawing/2010/main" w="9525">
                   <a:solidFill>
                     <a:srgbClr val="000000"/>
                   </a:solidFill>
@@ -3974,8 +3974,8 @@
               <a:noFill/>
             </a:ln>
             <a:extLst>
-              <a:ext uri="{91240B29-F687-4f45-9708-019B960494DF}">
-                <a14:hiddenLine xmlns:a14="http://schemas.microsoft.com/office/drawing/2010/main" xmlns="" w="9525">
+              <a:ext uri="{91240B29-F687-4F45-9708-019B960494DF}">
+                <a14:hiddenLine xmlns:a14="http://schemas.microsoft.com/office/drawing/2010/main" w="9525">
                   <a:solidFill>
                     <a:srgbClr val="000000"/>
                   </a:solidFill>
@@ -4094,8 +4094,8 @@
               <a:noFill/>
             </a:ln>
             <a:extLst>
-              <a:ext uri="{91240B29-F687-4f45-9708-019B960494DF}">
-                <a14:hiddenLine xmlns:a14="http://schemas.microsoft.com/office/drawing/2010/main" xmlns="" w="9525">
+              <a:ext uri="{91240B29-F687-4F45-9708-019B960494DF}">
+                <a14:hiddenLine xmlns:a14="http://schemas.microsoft.com/office/drawing/2010/main" w="9525">
                   <a:solidFill>
                     <a:srgbClr val="000000"/>
                   </a:solidFill>
@@ -4162,8 +4162,8 @@
               <a:noFill/>
             </a:ln>
             <a:extLst>
-              <a:ext uri="{91240B29-F687-4f45-9708-019B960494DF}">
-                <a14:hiddenLine xmlns:a14="http://schemas.microsoft.com/office/drawing/2010/main" xmlns="" w="9525">
+              <a:ext uri="{91240B29-F687-4F45-9708-019B960494DF}">
+                <a14:hiddenLine xmlns:a14="http://schemas.microsoft.com/office/drawing/2010/main" w="9525">
                   <a:solidFill>
                     <a:srgbClr val="000000"/>
                   </a:solidFill>
@@ -4252,8 +4252,8 @@
               <a:noFill/>
             </a:ln>
             <a:extLst>
-              <a:ext uri="{91240B29-F687-4f45-9708-019B960494DF}">
-                <a14:hiddenLine xmlns:a14="http://schemas.microsoft.com/office/drawing/2010/main" xmlns="" w="9525">
+              <a:ext uri="{91240B29-F687-4F45-9708-019B960494DF}">
+                <a14:hiddenLine xmlns:a14="http://schemas.microsoft.com/office/drawing/2010/main" w="9525">
                   <a:solidFill>
                     <a:srgbClr val="000000"/>
                   </a:solidFill>
@@ -4393,7 +4393,7 @@
           <a:p>
             <a:fld id="{48A87A34-81AB-432B-8DAE-1953F412C126}" type="datetimeFigureOut">
               <a:rPr lang="en-US" dirty="0"/>
-              <a:t>1/26/2020</a:t>
+              <a:t>1/27/2020</a:t>
             </a:fld>
             <a:endParaRPr lang="en-US" dirty="0"/>
           </a:p>
@@ -4655,7 +4655,7 @@
           <a:p>
             <a:fld id="{48A87A34-81AB-432B-8DAE-1953F412C126}" type="datetimeFigureOut">
               <a:rPr lang="en-US" dirty="0"/>
-              <a:t>1/26/2020</a:t>
+              <a:t>1/27/2020</a:t>
             </a:fld>
             <a:endParaRPr lang="en-US" dirty="0"/>
           </a:p>
@@ -4846,7 +4846,7 @@
           <a:p>
             <a:fld id="{48A87A34-81AB-432B-8DAE-1953F412C126}" type="datetimeFigureOut">
               <a:rPr lang="en-US" dirty="0"/>
-              <a:t>1/26/2020</a:t>
+              <a:t>1/27/2020</a:t>
             </a:fld>
             <a:endParaRPr lang="en-US" dirty="0"/>
           </a:p>
@@ -5104,7 +5104,7 @@
           <a:p>
             <a:fld id="{48A87A34-81AB-432B-8DAE-1953F412C126}" type="datetimeFigureOut">
               <a:rPr lang="en-US" dirty="0"/>
-              <a:t>1/26/2020</a:t>
+              <a:t>1/27/2020</a:t>
             </a:fld>
             <a:endParaRPr lang="en-US" dirty="0"/>
           </a:p>
@@ -5533,7 +5533,7 @@
           <a:p>
             <a:fld id="{48A87A34-81AB-432B-8DAE-1953F412C126}" type="datetimeFigureOut">
               <a:rPr lang="en-US" dirty="0"/>
-              <a:t>1/26/2020</a:t>
+              <a:t>1/27/2020</a:t>
             </a:fld>
             <a:endParaRPr lang="en-US" dirty="0"/>
           </a:p>
@@ -6074,7 +6074,7 @@
           <a:p>
             <a:fld id="{48A87A34-81AB-432B-8DAE-1953F412C126}" type="datetimeFigureOut">
               <a:rPr lang="en-US" dirty="0"/>
-              <a:t>1/26/2020</a:t>
+              <a:t>1/27/2020</a:t>
             </a:fld>
             <a:endParaRPr lang="en-US" dirty="0"/>
           </a:p>
@@ -6789,7 +6789,7 @@
           <a:p>
             <a:fld id="{48A87A34-81AB-432B-8DAE-1953F412C126}" type="datetimeFigureOut">
               <a:rPr lang="en-US" dirty="0"/>
-              <a:t>1/26/2020</a:t>
+              <a:t>1/27/2020</a:t>
             </a:fld>
             <a:endParaRPr lang="en-US" dirty="0"/>
           </a:p>
@@ -6954,7 +6954,7 @@
           <a:p>
             <a:fld id="{48A87A34-81AB-432B-8DAE-1953F412C126}" type="datetimeFigureOut">
               <a:rPr lang="en-US" dirty="0"/>
-              <a:t>1/26/2020</a:t>
+              <a:t>1/27/2020</a:t>
             </a:fld>
             <a:endParaRPr lang="en-US" dirty="0"/>
           </a:p>
@@ -7129,7 +7129,7 @@
           <a:p>
             <a:fld id="{48A87A34-81AB-432B-8DAE-1953F412C126}" type="datetimeFigureOut">
               <a:rPr lang="en-US" dirty="0"/>
-              <a:t>1/26/2020</a:t>
+              <a:t>1/27/2020</a:t>
             </a:fld>
             <a:endParaRPr lang="en-US" dirty="0"/>
           </a:p>
@@ -7294,7 +7294,7 @@
           <a:p>
             <a:fld id="{48A87A34-81AB-432B-8DAE-1953F412C126}" type="datetimeFigureOut">
               <a:rPr lang="en-US" dirty="0"/>
-              <a:t>1/26/2020</a:t>
+              <a:t>1/27/2020</a:t>
             </a:fld>
             <a:endParaRPr lang="en-US" dirty="0"/>
           </a:p>
@@ -7539,7 +7539,7 @@
           <a:p>
             <a:fld id="{48A87A34-81AB-432B-8DAE-1953F412C126}" type="datetimeFigureOut">
               <a:rPr lang="en-US" dirty="0"/>
-              <a:t>1/26/2020</a:t>
+              <a:t>1/27/2020</a:t>
             </a:fld>
             <a:endParaRPr lang="en-US" dirty="0"/>
           </a:p>
@@ -7766,7 +7766,7 @@
           <a:p>
             <a:fld id="{48A87A34-81AB-432B-8DAE-1953F412C126}" type="datetimeFigureOut">
               <a:rPr lang="en-US" dirty="0"/>
-              <a:t>1/26/2020</a:t>
+              <a:t>1/27/2020</a:t>
             </a:fld>
             <a:endParaRPr lang="en-US" dirty="0"/>
           </a:p>
@@ -8142,7 +8142,7 @@
           <a:p>
             <a:fld id="{48A87A34-81AB-432B-8DAE-1953F412C126}" type="datetimeFigureOut">
               <a:rPr lang="en-US" dirty="0"/>
-              <a:t>1/26/2020</a:t>
+              <a:t>1/27/2020</a:t>
             </a:fld>
             <a:endParaRPr lang="en-US" dirty="0"/>
           </a:p>
@@ -8255,7 +8255,7 @@
           <a:p>
             <a:fld id="{48A87A34-81AB-432B-8DAE-1953F412C126}" type="datetimeFigureOut">
               <a:rPr lang="en-US" dirty="0"/>
-              <a:t>1/26/2020</a:t>
+              <a:t>1/27/2020</a:t>
             </a:fld>
             <a:endParaRPr lang="en-US" dirty="0"/>
           </a:p>
@@ -8345,7 +8345,7 @@
           <a:p>
             <a:fld id="{48A87A34-81AB-432B-8DAE-1953F412C126}" type="datetimeFigureOut">
               <a:rPr lang="en-US" dirty="0"/>
-              <a:t>1/26/2020</a:t>
+              <a:t>1/27/2020</a:t>
             </a:fld>
             <a:endParaRPr lang="en-US" dirty="0"/>
           </a:p>
@@ -8589,7 +8589,7 @@
           <a:p>
             <a:fld id="{48A87A34-81AB-432B-8DAE-1953F412C126}" type="datetimeFigureOut">
               <a:rPr lang="en-US" dirty="0"/>
-              <a:t>1/26/2020</a:t>
+              <a:t>1/27/2020</a:t>
             </a:fld>
             <a:endParaRPr lang="en-US" dirty="0"/>
           </a:p>
@@ -8864,7 +8864,7 @@
           <a:p>
             <a:fld id="{48A87A34-81AB-432B-8DAE-1953F412C126}" type="datetimeFigureOut">
               <a:rPr lang="en-US" dirty="0"/>
-              <a:t>1/26/2020</a:t>
+              <a:t>1/27/2020</a:t>
             </a:fld>
             <a:endParaRPr lang="en-US" dirty="0"/>
           </a:p>
@@ -8974,8 +8974,8 @@
           </a:prstGeom>
           <a:noFill/>
           <a:extLst>
-            <a:ext uri="{909E8E84-426E-40dd-AFC4-6F175D3DCCD1}">
-              <a14:hiddenFill xmlns:a14="http://schemas.microsoft.com/office/drawing/2010/main" xmlns="">
+            <a:ext uri="{909E8E84-426E-40DD-AFC4-6F175D3DCCD1}">
+              <a14:hiddenFill xmlns:a14="http://schemas.microsoft.com/office/drawing/2010/main">
                 <a:solidFill>
                   <a:srgbClr val="FFFFFF"/>
                 </a:solidFill>
@@ -9048,8 +9048,8 @@
                 <a:noFill/>
               </a:ln>
               <a:extLst>
-                <a:ext uri="{91240B29-F687-4f45-9708-019B960494DF}">
-                  <a14:hiddenLine xmlns:a14="http://schemas.microsoft.com/office/drawing/2010/main" xmlns="" w="9525">
+                <a:ext uri="{91240B29-F687-4F45-9708-019B960494DF}">
+                  <a14:hiddenLine xmlns:a14="http://schemas.microsoft.com/office/drawing/2010/main" w="9525">
                     <a:solidFill>
                       <a:srgbClr val="000000"/>
                     </a:solidFill>
@@ -9138,8 +9138,8 @@
                 <a:noFill/>
               </a:ln>
               <a:extLst>
-                <a:ext uri="{91240B29-F687-4f45-9708-019B960494DF}">
-                  <a14:hiddenLine xmlns:a14="http://schemas.microsoft.com/office/drawing/2010/main" xmlns="" w="9525">
+                <a:ext uri="{91240B29-F687-4F45-9708-019B960494DF}">
+                  <a14:hiddenLine xmlns:a14="http://schemas.microsoft.com/office/drawing/2010/main" w="9525">
                     <a:solidFill>
                       <a:srgbClr val="000000"/>
                     </a:solidFill>
@@ -9228,8 +9228,8 @@
                 <a:noFill/>
               </a:ln>
               <a:extLst>
-                <a:ext uri="{91240B29-F687-4f45-9708-019B960494DF}">
-                  <a14:hiddenLine xmlns:a14="http://schemas.microsoft.com/office/drawing/2010/main" xmlns="" w="9525">
+                <a:ext uri="{91240B29-F687-4F45-9708-019B960494DF}">
+                  <a14:hiddenLine xmlns:a14="http://schemas.microsoft.com/office/drawing/2010/main" w="9525">
                     <a:solidFill>
                       <a:srgbClr val="000000"/>
                     </a:solidFill>
@@ -9290,8 +9290,8 @@
                 <a:noFill/>
               </a:ln>
               <a:extLst>
-                <a:ext uri="{91240B29-F687-4f45-9708-019B960494DF}">
-                  <a14:hiddenLine xmlns:a14="http://schemas.microsoft.com/office/drawing/2010/main" xmlns="" w="9525">
+                <a:ext uri="{91240B29-F687-4F45-9708-019B960494DF}">
+                  <a14:hiddenLine xmlns:a14="http://schemas.microsoft.com/office/drawing/2010/main" w="9525">
                     <a:solidFill>
                       <a:srgbClr val="000000"/>
                     </a:solidFill>
@@ -9380,8 +9380,8 @@
                 <a:noFill/>
               </a:ln>
               <a:extLst>
-                <a:ext uri="{91240B29-F687-4f45-9708-019B960494DF}">
-                  <a14:hiddenLine xmlns:a14="http://schemas.microsoft.com/office/drawing/2010/main" xmlns="" w="9525">
+                <a:ext uri="{91240B29-F687-4F45-9708-019B960494DF}">
+                  <a14:hiddenLine xmlns:a14="http://schemas.microsoft.com/office/drawing/2010/main" w="9525">
                     <a:solidFill>
                       <a:srgbClr val="000000"/>
                     </a:solidFill>
@@ -9442,8 +9442,8 @@
                 <a:noFill/>
               </a:ln>
               <a:extLst>
-                <a:ext uri="{91240B29-F687-4f45-9708-019B960494DF}">
-                  <a14:hiddenLine xmlns:a14="http://schemas.microsoft.com/office/drawing/2010/main" xmlns="" w="9525">
+                <a:ext uri="{91240B29-F687-4F45-9708-019B960494DF}">
+                  <a14:hiddenLine xmlns:a14="http://schemas.microsoft.com/office/drawing/2010/main" w="9525">
                     <a:solidFill>
                       <a:srgbClr val="000000"/>
                     </a:solidFill>
@@ -9504,8 +9504,8 @@
                 <a:noFill/>
               </a:ln>
               <a:extLst>
-                <a:ext uri="{91240B29-F687-4f45-9708-019B960494DF}">
-                  <a14:hiddenLine xmlns:a14="http://schemas.microsoft.com/office/drawing/2010/main" xmlns="" w="9525">
+                <a:ext uri="{91240B29-F687-4F45-9708-019B960494DF}">
+                  <a14:hiddenLine xmlns:a14="http://schemas.microsoft.com/office/drawing/2010/main" w="9525">
                     <a:solidFill>
                       <a:srgbClr val="000000"/>
                     </a:solidFill>
@@ -9594,8 +9594,8 @@
                 <a:noFill/>
               </a:ln>
               <a:extLst>
-                <a:ext uri="{91240B29-F687-4f45-9708-019B960494DF}">
-                  <a14:hiddenLine xmlns:a14="http://schemas.microsoft.com/office/drawing/2010/main" xmlns="" w="9525">
+                <a:ext uri="{91240B29-F687-4F45-9708-019B960494DF}">
+                  <a14:hiddenLine xmlns:a14="http://schemas.microsoft.com/office/drawing/2010/main" w="9525">
                     <a:solidFill>
                       <a:srgbClr val="000000"/>
                     </a:solidFill>
@@ -9684,8 +9684,8 @@
                 <a:noFill/>
               </a:ln>
               <a:extLst>
-                <a:ext uri="{91240B29-F687-4f45-9708-019B960494DF}">
-                  <a14:hiddenLine xmlns:a14="http://schemas.microsoft.com/office/drawing/2010/main" xmlns="" w="9525">
+                <a:ext uri="{91240B29-F687-4F45-9708-019B960494DF}">
+                  <a14:hiddenLine xmlns:a14="http://schemas.microsoft.com/office/drawing/2010/main" w="9525">
                     <a:solidFill>
                       <a:srgbClr val="000000"/>
                     </a:solidFill>
@@ -9746,8 +9746,8 @@
                 <a:noFill/>
               </a:ln>
               <a:extLst>
-                <a:ext uri="{91240B29-F687-4f45-9708-019B960494DF}">
-                  <a14:hiddenLine xmlns:a14="http://schemas.microsoft.com/office/drawing/2010/main" xmlns="" w="9525">
+                <a:ext uri="{91240B29-F687-4F45-9708-019B960494DF}">
+                  <a14:hiddenLine xmlns:a14="http://schemas.microsoft.com/office/drawing/2010/main" w="9525">
                     <a:solidFill>
                       <a:srgbClr val="000000"/>
                     </a:solidFill>
@@ -9856,8 +9856,8 @@
                 <a:noFill/>
               </a:ln>
               <a:extLst>
-                <a:ext uri="{91240B29-F687-4f45-9708-019B960494DF}">
-                  <a14:hiddenLine xmlns:a14="http://schemas.microsoft.com/office/drawing/2010/main" xmlns="" w="9525">
+                <a:ext uri="{91240B29-F687-4F45-9708-019B960494DF}">
+                  <a14:hiddenLine xmlns:a14="http://schemas.microsoft.com/office/drawing/2010/main" w="9525">
                     <a:solidFill>
                       <a:srgbClr val="000000"/>
                     </a:solidFill>
@@ -9940,8 +9940,8 @@
                 <a:noFill/>
               </a:ln>
               <a:extLst>
-                <a:ext uri="{91240B29-F687-4f45-9708-019B960494DF}">
-                  <a14:hiddenLine xmlns:a14="http://schemas.microsoft.com/office/drawing/2010/main" xmlns="" w="9525">
+                <a:ext uri="{91240B29-F687-4F45-9708-019B960494DF}">
+                  <a14:hiddenLine xmlns:a14="http://schemas.microsoft.com/office/drawing/2010/main" w="9525">
                     <a:solidFill>
                       <a:srgbClr val="000000"/>
                     </a:solidFill>
@@ -10002,8 +10002,8 @@
                 <a:noFill/>
               </a:ln>
               <a:extLst>
-                <a:ext uri="{91240B29-F687-4f45-9708-019B960494DF}">
-                  <a14:hiddenLine xmlns:a14="http://schemas.microsoft.com/office/drawing/2010/main" xmlns="" w="9525">
+                <a:ext uri="{91240B29-F687-4F45-9708-019B960494DF}">
+                  <a14:hiddenLine xmlns:a14="http://schemas.microsoft.com/office/drawing/2010/main" w="9525">
                     <a:solidFill>
                       <a:srgbClr val="000000"/>
                     </a:solidFill>
@@ -10064,8 +10064,8 @@
                 <a:noFill/>
               </a:ln>
               <a:extLst>
-                <a:ext uri="{91240B29-F687-4f45-9708-019B960494DF}">
-                  <a14:hiddenLine xmlns:a14="http://schemas.microsoft.com/office/drawing/2010/main" xmlns="" w="9525">
+                <a:ext uri="{91240B29-F687-4F45-9708-019B960494DF}">
+                  <a14:hiddenLine xmlns:a14="http://schemas.microsoft.com/office/drawing/2010/main" w="9525">
                     <a:solidFill>
                       <a:srgbClr val="000000"/>
                     </a:solidFill>
@@ -10154,8 +10154,8 @@
                 <a:noFill/>
               </a:ln>
               <a:extLst>
-                <a:ext uri="{91240B29-F687-4f45-9708-019B960494DF}">
-                  <a14:hiddenLine xmlns:a14="http://schemas.microsoft.com/office/drawing/2010/main" xmlns="" w="9525">
+                <a:ext uri="{91240B29-F687-4F45-9708-019B960494DF}">
+                  <a14:hiddenLine xmlns:a14="http://schemas.microsoft.com/office/drawing/2010/main" w="9525">
                     <a:solidFill>
                       <a:srgbClr val="000000"/>
                     </a:solidFill>
@@ -10188,8 +10188,8 @@
                 <a:noFill/>
               </a:ln>
               <a:extLst>
-                <a:ext uri="{91240B29-F687-4f45-9708-019B960494DF}">
-                  <a14:hiddenLine xmlns:a14="http://schemas.microsoft.com/office/drawing/2010/main" xmlns="" w="9525">
+                <a:ext uri="{91240B29-F687-4F45-9708-019B960494DF}">
+                  <a14:hiddenLine xmlns:a14="http://schemas.microsoft.com/office/drawing/2010/main" w="9525">
                     <a:solidFill>
                       <a:srgbClr val="000000"/>
                     </a:solidFill>
@@ -10253,8 +10253,8 @@
                 <a:noFill/>
               </a:ln>
               <a:extLst>
-                <a:ext uri="{91240B29-F687-4f45-9708-019B960494DF}">
-                  <a14:hiddenLine xmlns:a14="http://schemas.microsoft.com/office/drawing/2010/main" xmlns="" w="9525">
+                <a:ext uri="{91240B29-F687-4F45-9708-019B960494DF}">
+                  <a14:hiddenLine xmlns:a14="http://schemas.microsoft.com/office/drawing/2010/main" w="9525">
                     <a:solidFill>
                       <a:srgbClr val="000000"/>
                     </a:solidFill>
@@ -10343,8 +10343,8 @@
                 <a:noFill/>
               </a:ln>
               <a:extLst>
-                <a:ext uri="{91240B29-F687-4f45-9708-019B960494DF}">
-                  <a14:hiddenLine xmlns:a14="http://schemas.microsoft.com/office/drawing/2010/main" xmlns="" w="9525">
+                <a:ext uri="{91240B29-F687-4F45-9708-019B960494DF}">
+                  <a14:hiddenLine xmlns:a14="http://schemas.microsoft.com/office/drawing/2010/main" w="9525">
                     <a:solidFill>
                       <a:srgbClr val="000000"/>
                     </a:solidFill>
@@ -10405,8 +10405,8 @@
                 <a:noFill/>
               </a:ln>
               <a:extLst>
-                <a:ext uri="{91240B29-F687-4f45-9708-019B960494DF}">
-                  <a14:hiddenLine xmlns:a14="http://schemas.microsoft.com/office/drawing/2010/main" xmlns="" w="9525">
+                <a:ext uri="{91240B29-F687-4F45-9708-019B960494DF}">
+                  <a14:hiddenLine xmlns:a14="http://schemas.microsoft.com/office/drawing/2010/main" w="9525">
                     <a:solidFill>
                       <a:srgbClr val="000000"/>
                     </a:solidFill>
@@ -10495,8 +10495,8 @@
                 <a:noFill/>
               </a:ln>
               <a:extLst>
-                <a:ext uri="{91240B29-F687-4f45-9708-019B960494DF}">
-                  <a14:hiddenLine xmlns:a14="http://schemas.microsoft.com/office/drawing/2010/main" xmlns="" w="9525">
+                <a:ext uri="{91240B29-F687-4F45-9708-019B960494DF}">
+                  <a14:hiddenLine xmlns:a14="http://schemas.microsoft.com/office/drawing/2010/main" w="9525">
                     <a:solidFill>
                       <a:srgbClr val="000000"/>
                     </a:solidFill>
@@ -10560,8 +10560,8 @@
                 <a:noFill/>
               </a:ln>
               <a:extLst>
-                <a:ext uri="{91240B29-F687-4f45-9708-019B960494DF}">
-                  <a14:hiddenLine xmlns:a14="http://schemas.microsoft.com/office/drawing/2010/main" xmlns="" w="9525">
+                <a:ext uri="{91240B29-F687-4F45-9708-019B960494DF}">
+                  <a14:hiddenLine xmlns:a14="http://schemas.microsoft.com/office/drawing/2010/main" w="9525">
                     <a:solidFill>
                       <a:srgbClr val="000000"/>
                     </a:solidFill>
@@ -10622,8 +10622,8 @@
                 <a:noFill/>
               </a:ln>
               <a:extLst>
-                <a:ext uri="{91240B29-F687-4f45-9708-019B960494DF}">
-                  <a14:hiddenLine xmlns:a14="http://schemas.microsoft.com/office/drawing/2010/main" xmlns="" w="9525">
+                <a:ext uri="{91240B29-F687-4F45-9708-019B960494DF}">
+                  <a14:hiddenLine xmlns:a14="http://schemas.microsoft.com/office/drawing/2010/main" w="9525">
                     <a:solidFill>
                       <a:srgbClr val="000000"/>
                     </a:solidFill>
@@ -10712,8 +10712,8 @@
                 <a:noFill/>
               </a:ln>
               <a:extLst>
-                <a:ext uri="{91240B29-F687-4f45-9708-019B960494DF}">
-                  <a14:hiddenLine xmlns:a14="http://schemas.microsoft.com/office/drawing/2010/main" xmlns="" w="9525">
+                <a:ext uri="{91240B29-F687-4F45-9708-019B960494DF}">
+                  <a14:hiddenLine xmlns:a14="http://schemas.microsoft.com/office/drawing/2010/main" w="9525">
                     <a:solidFill>
                       <a:srgbClr val="000000"/>
                     </a:solidFill>
@@ -10802,8 +10802,8 @@
                 <a:noFill/>
               </a:ln>
               <a:extLst>
-                <a:ext uri="{91240B29-F687-4f45-9708-019B960494DF}">
-                  <a14:hiddenLine xmlns:a14="http://schemas.microsoft.com/office/drawing/2010/main" xmlns="" w="9525">
+                <a:ext uri="{91240B29-F687-4F45-9708-019B960494DF}">
+                  <a14:hiddenLine xmlns:a14="http://schemas.microsoft.com/office/drawing/2010/main" w="9525">
                     <a:solidFill>
                       <a:srgbClr val="000000"/>
                     </a:solidFill>
@@ -10867,8 +10867,8 @@
                 <a:noFill/>
               </a:ln>
               <a:extLst>
-                <a:ext uri="{91240B29-F687-4f45-9708-019B960494DF}">
-                  <a14:hiddenLine xmlns:a14="http://schemas.microsoft.com/office/drawing/2010/main" xmlns="" w="9525">
+                <a:ext uri="{91240B29-F687-4F45-9708-019B960494DF}">
+                  <a14:hiddenLine xmlns:a14="http://schemas.microsoft.com/office/drawing/2010/main" w="9525">
                     <a:solidFill>
                       <a:srgbClr val="000000"/>
                     </a:solidFill>
@@ -10987,8 +10987,8 @@
                 <a:noFill/>
               </a:ln>
               <a:extLst>
-                <a:ext uri="{91240B29-F687-4f45-9708-019B960494DF}">
-                  <a14:hiddenLine xmlns:a14="http://schemas.microsoft.com/office/drawing/2010/main" xmlns="" w="9525">
+                <a:ext uri="{91240B29-F687-4F45-9708-019B960494DF}">
+                  <a14:hiddenLine xmlns:a14="http://schemas.microsoft.com/office/drawing/2010/main" w="9525">
                     <a:solidFill>
                       <a:srgbClr val="000000"/>
                     </a:solidFill>
@@ -11085,8 +11085,8 @@
                 <a:noFill/>
               </a:ln>
               <a:extLst>
-                <a:ext uri="{91240B29-F687-4f45-9708-019B960494DF}">
-                  <a14:hiddenLine xmlns:a14="http://schemas.microsoft.com/office/drawing/2010/main" xmlns="" w="9525">
+                <a:ext uri="{91240B29-F687-4F45-9708-019B960494DF}">
+                  <a14:hiddenLine xmlns:a14="http://schemas.microsoft.com/office/drawing/2010/main" w="9525">
                     <a:solidFill>
                       <a:srgbClr val="000000"/>
                     </a:solidFill>
@@ -11200,8 +11200,8 @@
                 <a:noFill/>
               </a:ln>
               <a:extLst>
-                <a:ext uri="{91240B29-F687-4f45-9708-019B960494DF}">
-                  <a14:hiddenLine xmlns:a14="http://schemas.microsoft.com/office/drawing/2010/main" xmlns="" w="9525">
+                <a:ext uri="{91240B29-F687-4F45-9708-019B960494DF}">
+                  <a14:hiddenLine xmlns:a14="http://schemas.microsoft.com/office/drawing/2010/main" w="9525">
                     <a:solidFill>
                       <a:srgbClr val="000000"/>
                     </a:solidFill>
@@ -11290,8 +11290,8 @@
                 <a:noFill/>
               </a:ln>
               <a:extLst>
-                <a:ext uri="{91240B29-F687-4f45-9708-019B960494DF}">
-                  <a14:hiddenLine xmlns:a14="http://schemas.microsoft.com/office/drawing/2010/main" xmlns="" w="9525">
+                <a:ext uri="{91240B29-F687-4F45-9708-019B960494DF}">
+                  <a14:hiddenLine xmlns:a14="http://schemas.microsoft.com/office/drawing/2010/main" w="9525">
                     <a:solidFill>
                       <a:srgbClr val="000000"/>
                     </a:solidFill>
@@ -11355,8 +11355,8 @@
                 <a:noFill/>
               </a:ln>
               <a:extLst>
-                <a:ext uri="{91240B29-F687-4f45-9708-019B960494DF}">
-                  <a14:hiddenLine xmlns:a14="http://schemas.microsoft.com/office/drawing/2010/main" xmlns="" w="9525">
+                <a:ext uri="{91240B29-F687-4F45-9708-019B960494DF}">
+                  <a14:hiddenLine xmlns:a14="http://schemas.microsoft.com/office/drawing/2010/main" w="9525">
                     <a:solidFill>
                       <a:srgbClr val="000000"/>
                     </a:solidFill>
@@ -11445,8 +11445,8 @@
                 <a:noFill/>
               </a:ln>
               <a:extLst>
-                <a:ext uri="{91240B29-F687-4f45-9708-019B960494DF}">
-                  <a14:hiddenLine xmlns:a14="http://schemas.microsoft.com/office/drawing/2010/main" xmlns="" w="9525">
+                <a:ext uri="{91240B29-F687-4F45-9708-019B960494DF}">
+                  <a14:hiddenLine xmlns:a14="http://schemas.microsoft.com/office/drawing/2010/main" w="9525">
                     <a:solidFill>
                       <a:srgbClr val="000000"/>
                     </a:solidFill>
@@ -11513,8 +11513,8 @@
                 <a:noFill/>
               </a:ln>
               <a:extLst>
-                <a:ext uri="{91240B29-F687-4f45-9708-019B960494DF}">
-                  <a14:hiddenLine xmlns:a14="http://schemas.microsoft.com/office/drawing/2010/main" xmlns="" w="9525">
+                <a:ext uri="{91240B29-F687-4F45-9708-019B960494DF}">
+                  <a14:hiddenLine xmlns:a14="http://schemas.microsoft.com/office/drawing/2010/main" w="9525">
                     <a:solidFill>
                       <a:srgbClr val="000000"/>
                     </a:solidFill>
@@ -11603,8 +11603,8 @@
                 <a:noFill/>
               </a:ln>
               <a:extLst>
-                <a:ext uri="{91240B29-F687-4f45-9708-019B960494DF}">
-                  <a14:hiddenLine xmlns:a14="http://schemas.microsoft.com/office/drawing/2010/main" xmlns="" w="9525">
+                <a:ext uri="{91240B29-F687-4F45-9708-019B960494DF}">
+                  <a14:hiddenLine xmlns:a14="http://schemas.microsoft.com/office/drawing/2010/main" w="9525">
                     <a:solidFill>
                       <a:srgbClr val="000000"/>
                     </a:solidFill>
@@ -11671,8 +11671,8 @@
                 <a:noFill/>
               </a:ln>
               <a:extLst>
-                <a:ext uri="{91240B29-F687-4f45-9708-019B960494DF}">
-                  <a14:hiddenLine xmlns:a14="http://schemas.microsoft.com/office/drawing/2010/main" xmlns="" w="9525">
+                <a:ext uri="{91240B29-F687-4F45-9708-019B960494DF}">
+                  <a14:hiddenLine xmlns:a14="http://schemas.microsoft.com/office/drawing/2010/main" w="9525">
                     <a:solidFill>
                       <a:srgbClr val="000000"/>
                     </a:solidFill>
@@ -11761,8 +11761,8 @@
                 <a:noFill/>
               </a:ln>
               <a:extLst>
-                <a:ext uri="{91240B29-F687-4f45-9708-019B960494DF}">
-                  <a14:hiddenLine xmlns:a14="http://schemas.microsoft.com/office/drawing/2010/main" xmlns="" w="9525">
+                <a:ext uri="{91240B29-F687-4F45-9708-019B960494DF}">
+                  <a14:hiddenLine xmlns:a14="http://schemas.microsoft.com/office/drawing/2010/main" w="9525">
                     <a:solidFill>
                       <a:srgbClr val="000000"/>
                     </a:solidFill>
@@ -11795,8 +11795,8 @@
                 <a:noFill/>
               </a:ln>
               <a:extLst>
-                <a:ext uri="{91240B29-F687-4f45-9708-019B960494DF}">
-                  <a14:hiddenLine xmlns:a14="http://schemas.microsoft.com/office/drawing/2010/main" xmlns="" w="9525">
+                <a:ext uri="{91240B29-F687-4F45-9708-019B960494DF}">
+                  <a14:hiddenLine xmlns:a14="http://schemas.microsoft.com/office/drawing/2010/main" w="9525">
                     <a:solidFill>
                       <a:srgbClr val="000000"/>
                     </a:solidFill>
@@ -11937,7 +11937,7 @@
             <a:fld id="{48A87A34-81AB-432B-8DAE-1953F412C126}" type="datetimeFigureOut">
               <a:rPr lang="en-US" dirty="0"/>
               <a:pPr/>
-              <a:t>1/26/2020</a:t>
+              <a:t>1/27/2020</a:t>
             </a:fld>
             <a:endParaRPr lang="en-US" dirty="0"/>
           </a:p>
@@ -12744,7 +12744,83 @@
   <p:timing>
     <p:tnLst>
       <p:par>
-        <p:cTn id="1" dur="indefinite" restart="never" nodeType="tmRoot"/>
+        <p:cTn id="1" dur="indefinite" restart="never" nodeType="tmRoot">
+          <p:childTnLst>
+            <p:seq concurrent="1" nextAc="seek">
+              <p:cTn id="2" dur="indefinite" nodeType="mainSeq">
+                <p:childTnLst>
+                  <p:par>
+                    <p:cTn id="3" fill="hold">
+                      <p:stCondLst>
+                        <p:cond delay="indefinite"/>
+                      </p:stCondLst>
+                      <p:childTnLst>
+                        <p:par>
+                          <p:cTn id="4" fill="hold">
+                            <p:stCondLst>
+                              <p:cond delay="0"/>
+                            </p:stCondLst>
+                            <p:childTnLst>
+                              <p:par>
+                                <p:cTn id="5" presetID="10" presetClass="entr" presetSubtype="0" fill="hold" nodeType="clickEffect">
+                                  <p:stCondLst>
+                                    <p:cond delay="0"/>
+                                  </p:stCondLst>
+                                  <p:childTnLst>
+                                    <p:set>
+                                      <p:cBhvr>
+                                        <p:cTn id="6" dur="1" fill="hold">
+                                          <p:stCondLst>
+                                            <p:cond delay="0"/>
+                                          </p:stCondLst>
+                                        </p:cTn>
+                                        <p:tgtEl>
+                                          <p:spTgt spid="6"/>
+                                        </p:tgtEl>
+                                        <p:attrNameLst>
+                                          <p:attrName>style.visibility</p:attrName>
+                                        </p:attrNameLst>
+                                      </p:cBhvr>
+                                      <p:to>
+                                        <p:strVal val="visible"/>
+                                      </p:to>
+                                    </p:set>
+                                    <p:animEffect transition="in" filter="fade">
+                                      <p:cBhvr>
+                                        <p:cTn id="7" dur="1000"/>
+                                        <p:tgtEl>
+                                          <p:spTgt spid="6"/>
+                                        </p:tgtEl>
+                                      </p:cBhvr>
+                                    </p:animEffect>
+                                  </p:childTnLst>
+                                </p:cTn>
+                              </p:par>
+                            </p:childTnLst>
+                          </p:cTn>
+                        </p:par>
+                      </p:childTnLst>
+                    </p:cTn>
+                  </p:par>
+                </p:childTnLst>
+              </p:cTn>
+              <p:prevCondLst>
+                <p:cond evt="onPrev" delay="0">
+                  <p:tgtEl>
+                    <p:sldTgt/>
+                  </p:tgtEl>
+                </p:cond>
+              </p:prevCondLst>
+              <p:nextCondLst>
+                <p:cond evt="onNext" delay="0">
+                  <p:tgtEl>
+                    <p:sldTgt/>
+                  </p:tgtEl>
+                </p:cond>
+              </p:nextCondLst>
+            </p:seq>
+          </p:childTnLst>
+        </p:cTn>
       </p:par>
     </p:tnLst>
   </p:timing>
@@ -13094,6 +13170,9 @@
   <p:clrMapOvr>
     <a:masterClrMapping/>
   </p:clrMapOvr>
+  <p:transition spd="slow">
+    <p:cover/>
+  </p:transition>
   <p:timing>
     <p:tnLst>
       <p:par>
@@ -13189,8 +13268,8 @@
         </p:nvSpPr>
         <p:spPr>
           <a:xfrm>
-            <a:off x="1232612" y="3069771"/>
-            <a:ext cx="2648923" cy="3704253"/>
+            <a:off x="906040" y="3069772"/>
+            <a:ext cx="3418132" cy="2004526"/>
           </a:xfrm>
           <a:prstGeom prst="rect">
             <a:avLst/>
@@ -13198,7 +13277,7 @@
         </p:spPr>
         <p:txBody>
           <a:bodyPr vert="horz" lIns="91440" tIns="45720" rIns="91440" bIns="45720" rtlCol="0">
-            <a:normAutofit fontScale="92500" lnSpcReduction="10000"/>
+            <a:normAutofit/>
           </a:bodyPr>
           <a:lstStyle>
             <a:lvl1pPr marL="228600" indent="-228600" algn="l" defTabSz="914400" rtl="0" eaLnBrk="1" latinLnBrk="0" hangingPunct="1">
@@ -13382,13 +13461,6 @@
           <a:p>
             <a:endParaRPr lang="en-IE" dirty="0" smtClean="0"/>
           </a:p>
-          <a:p>
-            <a:r>
-              <a:rPr lang="en-IE" dirty="0" smtClean="0"/>
-              <a:t>Based on chemical data, not marketing or financial.</a:t>
-            </a:r>
-            <a:endParaRPr lang="en-IE" dirty="0"/>
-          </a:p>
         </p:txBody>
       </p:sp>
       <p:pic>
@@ -13525,6 +13597,213 @@
           </a:p>
         </p:txBody>
       </p:sp>
+      <p:sp>
+        <p:nvSpPr>
+          <p:cNvPr id="9" name="Subtitle 2"/>
+          <p:cNvSpPr txBox="1">
+            <a:spLocks/>
+          </p:cNvSpPr>
+          <p:nvPr/>
+        </p:nvSpPr>
+        <p:spPr>
+          <a:xfrm>
+            <a:off x="1786030" y="5133316"/>
+            <a:ext cx="3418132" cy="1534028"/>
+          </a:xfrm>
+          <a:prstGeom prst="rect">
+            <a:avLst/>
+          </a:prstGeom>
+        </p:spPr>
+        <p:txBody>
+          <a:bodyPr vert="horz" lIns="91440" tIns="45720" rIns="91440" bIns="45720" rtlCol="0">
+            <a:normAutofit/>
+          </a:bodyPr>
+          <a:lstStyle>
+            <a:lvl1pPr marL="228600" indent="-228600" algn="l" defTabSz="914400" rtl="0" eaLnBrk="1" latinLnBrk="0" hangingPunct="1">
+              <a:lnSpc>
+                <a:spcPct val="120000"/>
+              </a:lnSpc>
+              <a:spcBef>
+                <a:spcPts val="1000"/>
+              </a:spcBef>
+              <a:buSzPct val="125000"/>
+              <a:buFont typeface="Arial" panose="020B0604020202020204" pitchFamily="34" charset="0"/>
+              <a:buChar char="•"/>
+              <a:defRPr sz="2400" kern="1200">
+                <a:solidFill>
+                  <a:schemeClr val="tx1"/>
+                </a:solidFill>
+                <a:latin typeface="+mn-lt"/>
+                <a:ea typeface="+mn-ea"/>
+                <a:cs typeface="+mn-cs"/>
+              </a:defRPr>
+            </a:lvl1pPr>
+            <a:lvl2pPr marL="685800" indent="-228600" algn="l" defTabSz="914400" rtl="0" eaLnBrk="1" latinLnBrk="0" hangingPunct="1">
+              <a:lnSpc>
+                <a:spcPct val="120000"/>
+              </a:lnSpc>
+              <a:spcBef>
+                <a:spcPts val="500"/>
+              </a:spcBef>
+              <a:buSzPct val="125000"/>
+              <a:buFont typeface="Arial" panose="020B0604020202020204" pitchFamily="34" charset="0"/>
+              <a:buChar char="•"/>
+              <a:defRPr sz="2000" kern="1200">
+                <a:solidFill>
+                  <a:schemeClr val="tx1"/>
+                </a:solidFill>
+                <a:latin typeface="+mn-lt"/>
+                <a:ea typeface="+mn-ea"/>
+                <a:cs typeface="+mn-cs"/>
+              </a:defRPr>
+            </a:lvl2pPr>
+            <a:lvl3pPr marL="1143000" indent="-228600" algn="l" defTabSz="914400" rtl="0" eaLnBrk="1" latinLnBrk="0" hangingPunct="1">
+              <a:lnSpc>
+                <a:spcPct val="120000"/>
+              </a:lnSpc>
+              <a:spcBef>
+                <a:spcPts val="500"/>
+              </a:spcBef>
+              <a:buSzPct val="125000"/>
+              <a:buFont typeface="Arial" panose="020B0604020202020204" pitchFamily="34" charset="0"/>
+              <a:buChar char="•"/>
+              <a:defRPr sz="1800" kern="1200">
+                <a:solidFill>
+                  <a:schemeClr val="tx1"/>
+                </a:solidFill>
+                <a:latin typeface="+mn-lt"/>
+                <a:ea typeface="+mn-ea"/>
+                <a:cs typeface="+mn-cs"/>
+              </a:defRPr>
+            </a:lvl3pPr>
+            <a:lvl4pPr marL="1600200" indent="-228600" algn="l" defTabSz="914400" rtl="0" eaLnBrk="1" latinLnBrk="0" hangingPunct="1">
+              <a:lnSpc>
+                <a:spcPct val="120000"/>
+              </a:lnSpc>
+              <a:spcBef>
+                <a:spcPts val="500"/>
+              </a:spcBef>
+              <a:buSzPct val="125000"/>
+              <a:buFont typeface="Arial" panose="020B0604020202020204" pitchFamily="34" charset="0"/>
+              <a:buChar char="•"/>
+              <a:defRPr sz="1600" kern="1200">
+                <a:solidFill>
+                  <a:schemeClr val="tx1"/>
+                </a:solidFill>
+                <a:latin typeface="+mn-lt"/>
+                <a:ea typeface="+mn-ea"/>
+                <a:cs typeface="+mn-cs"/>
+              </a:defRPr>
+            </a:lvl4pPr>
+            <a:lvl5pPr marL="2057400" indent="-228600" algn="l" defTabSz="914400" rtl="0" eaLnBrk="1" latinLnBrk="0" hangingPunct="1">
+              <a:lnSpc>
+                <a:spcPct val="120000"/>
+              </a:lnSpc>
+              <a:spcBef>
+                <a:spcPts val="500"/>
+              </a:spcBef>
+              <a:buSzPct val="125000"/>
+              <a:buFont typeface="Arial" panose="020B0604020202020204" pitchFamily="34" charset="0"/>
+              <a:buChar char="•"/>
+              <a:defRPr sz="1600" kern="1200">
+                <a:solidFill>
+                  <a:schemeClr val="tx1"/>
+                </a:solidFill>
+                <a:latin typeface="+mn-lt"/>
+                <a:ea typeface="+mn-ea"/>
+                <a:cs typeface="+mn-cs"/>
+              </a:defRPr>
+            </a:lvl5pPr>
+            <a:lvl6pPr marL="2514600" indent="-228600" algn="l" defTabSz="914400" rtl="0" eaLnBrk="1" latinLnBrk="0" hangingPunct="1">
+              <a:lnSpc>
+                <a:spcPct val="120000"/>
+              </a:lnSpc>
+              <a:spcBef>
+                <a:spcPts val="500"/>
+              </a:spcBef>
+              <a:buSzPct val="125000"/>
+              <a:buFont typeface="Arial" panose="020B0604020202020204" pitchFamily="34" charset="0"/>
+              <a:buChar char="•"/>
+              <a:defRPr sz="1400" kern="1200">
+                <a:solidFill>
+                  <a:schemeClr val="tx1"/>
+                </a:solidFill>
+                <a:latin typeface="+mn-lt"/>
+                <a:ea typeface="+mn-ea"/>
+                <a:cs typeface="+mn-cs"/>
+              </a:defRPr>
+            </a:lvl6pPr>
+            <a:lvl7pPr marL="2971800" indent="-228600" algn="l" defTabSz="914400" rtl="0" eaLnBrk="1" latinLnBrk="0" hangingPunct="1">
+              <a:lnSpc>
+                <a:spcPct val="120000"/>
+              </a:lnSpc>
+              <a:spcBef>
+                <a:spcPts val="500"/>
+              </a:spcBef>
+              <a:buSzPct val="125000"/>
+              <a:buFont typeface="Arial" panose="020B0604020202020204" pitchFamily="34" charset="0"/>
+              <a:buChar char="•"/>
+              <a:defRPr sz="1400" kern="1200">
+                <a:solidFill>
+                  <a:schemeClr val="tx1"/>
+                </a:solidFill>
+                <a:latin typeface="+mn-lt"/>
+                <a:ea typeface="+mn-ea"/>
+                <a:cs typeface="+mn-cs"/>
+              </a:defRPr>
+            </a:lvl7pPr>
+            <a:lvl8pPr marL="3429000" indent="-228600" algn="l" defTabSz="914400" rtl="0" eaLnBrk="1" latinLnBrk="0" hangingPunct="1">
+              <a:lnSpc>
+                <a:spcPct val="120000"/>
+              </a:lnSpc>
+              <a:spcBef>
+                <a:spcPts val="500"/>
+              </a:spcBef>
+              <a:buSzPct val="125000"/>
+              <a:buFont typeface="Arial" panose="020B0604020202020204" pitchFamily="34" charset="0"/>
+              <a:buChar char="•"/>
+              <a:defRPr sz="1400" kern="1200">
+                <a:solidFill>
+                  <a:schemeClr val="tx1"/>
+                </a:solidFill>
+                <a:latin typeface="+mn-lt"/>
+                <a:ea typeface="+mn-ea"/>
+                <a:cs typeface="+mn-cs"/>
+              </a:defRPr>
+            </a:lvl8pPr>
+            <a:lvl9pPr marL="3886200" indent="-228600" algn="l" defTabSz="914400" rtl="0" eaLnBrk="1" latinLnBrk="0" hangingPunct="1">
+              <a:lnSpc>
+                <a:spcPct val="120000"/>
+              </a:lnSpc>
+              <a:spcBef>
+                <a:spcPts val="500"/>
+              </a:spcBef>
+              <a:buSzPct val="125000"/>
+              <a:buFont typeface="Arial" panose="020B0604020202020204" pitchFamily="34" charset="0"/>
+              <a:buChar char="•"/>
+              <a:defRPr sz="1400" kern="1200">
+                <a:solidFill>
+                  <a:schemeClr val="tx1"/>
+                </a:solidFill>
+                <a:latin typeface="+mn-lt"/>
+                <a:ea typeface="+mn-ea"/>
+                <a:cs typeface="+mn-cs"/>
+              </a:defRPr>
+            </a:lvl9pPr>
+          </a:lstStyle>
+          <a:p>
+            <a:r>
+              <a:rPr lang="en-IE" dirty="0" smtClean="0"/>
+              <a:t>Based </a:t>
+            </a:r>
+            <a:r>
+              <a:rPr lang="en-IE" dirty="0" smtClean="0"/>
+              <a:t>on chemical data, not marketing or financial.</a:t>
+            </a:r>
+            <a:endParaRPr lang="en-IE" dirty="0"/>
+          </a:p>
+        </p:txBody>
+      </p:sp>
     </p:spTree>
     <p:extLst>
       <p:ext uri="{BB962C8B-B14F-4D97-AF65-F5344CB8AC3E}">
@@ -13535,12 +13814,392 @@
   <p:clrMapOvr>
     <a:masterClrMapping/>
   </p:clrMapOvr>
+  <p:transition spd="slow">
+    <p:cover/>
+  </p:transition>
   <p:timing>
     <p:tnLst>
       <p:par>
-        <p:cTn id="1" dur="indefinite" restart="never" nodeType="tmRoot"/>
+        <p:cTn id="1" dur="indefinite" restart="never" nodeType="tmRoot">
+          <p:childTnLst>
+            <p:seq concurrent="1" nextAc="seek">
+              <p:cTn id="2" dur="indefinite" nodeType="mainSeq">
+                <p:childTnLst>
+                  <p:par>
+                    <p:cTn id="3" fill="hold">
+                      <p:stCondLst>
+                        <p:cond delay="indefinite"/>
+                      </p:stCondLst>
+                      <p:childTnLst>
+                        <p:par>
+                          <p:cTn id="4" fill="hold">
+                            <p:stCondLst>
+                              <p:cond delay="0"/>
+                            </p:stCondLst>
+                            <p:childTnLst>
+                              <p:par>
+                                <p:cTn id="5" presetID="42" presetClass="entr" presetSubtype="0" fill="hold" grpId="0" nodeType="clickEffect">
+                                  <p:stCondLst>
+                                    <p:cond delay="0"/>
+                                  </p:stCondLst>
+                                  <p:childTnLst>
+                                    <p:set>
+                                      <p:cBhvr>
+                                        <p:cTn id="6" dur="1" fill="hold">
+                                          <p:stCondLst>
+                                            <p:cond delay="0"/>
+                                          </p:stCondLst>
+                                        </p:cTn>
+                                        <p:tgtEl>
+                                          <p:spTgt spid="4"/>
+                                        </p:tgtEl>
+                                        <p:attrNameLst>
+                                          <p:attrName>style.visibility</p:attrName>
+                                        </p:attrNameLst>
+                                      </p:cBhvr>
+                                      <p:to>
+                                        <p:strVal val="visible"/>
+                                      </p:to>
+                                    </p:set>
+                                    <p:animEffect transition="in" filter="fade">
+                                      <p:cBhvr>
+                                        <p:cTn id="7" dur="1000"/>
+                                        <p:tgtEl>
+                                          <p:spTgt spid="4"/>
+                                        </p:tgtEl>
+                                      </p:cBhvr>
+                                    </p:animEffect>
+                                    <p:anim calcmode="lin" valueType="num">
+                                      <p:cBhvr>
+                                        <p:cTn id="8" dur="1000" fill="hold"/>
+                                        <p:tgtEl>
+                                          <p:spTgt spid="4"/>
+                                        </p:tgtEl>
+                                        <p:attrNameLst>
+                                          <p:attrName>ppt_x</p:attrName>
+                                        </p:attrNameLst>
+                                      </p:cBhvr>
+                                      <p:tavLst>
+                                        <p:tav tm="0">
+                                          <p:val>
+                                            <p:strVal val="#ppt_x"/>
+                                          </p:val>
+                                        </p:tav>
+                                        <p:tav tm="100000">
+                                          <p:val>
+                                            <p:strVal val="#ppt_x"/>
+                                          </p:val>
+                                        </p:tav>
+                                      </p:tavLst>
+                                    </p:anim>
+                                    <p:anim calcmode="lin" valueType="num">
+                                      <p:cBhvr>
+                                        <p:cTn id="9" dur="1000" fill="hold"/>
+                                        <p:tgtEl>
+                                          <p:spTgt spid="4"/>
+                                        </p:tgtEl>
+                                        <p:attrNameLst>
+                                          <p:attrName>ppt_y</p:attrName>
+                                        </p:attrNameLst>
+                                      </p:cBhvr>
+                                      <p:tavLst>
+                                        <p:tav tm="0">
+                                          <p:val>
+                                            <p:strVal val="#ppt_y+.1"/>
+                                          </p:val>
+                                        </p:tav>
+                                        <p:tav tm="100000">
+                                          <p:val>
+                                            <p:strVal val="#ppt_y"/>
+                                          </p:val>
+                                        </p:tav>
+                                      </p:tavLst>
+                                    </p:anim>
+                                  </p:childTnLst>
+                                </p:cTn>
+                              </p:par>
+                            </p:childTnLst>
+                          </p:cTn>
+                        </p:par>
+                      </p:childTnLst>
+                    </p:cTn>
+                  </p:par>
+                  <p:par>
+                    <p:cTn id="10" fill="hold">
+                      <p:stCondLst>
+                        <p:cond delay="indefinite"/>
+                      </p:stCondLst>
+                      <p:childTnLst>
+                        <p:par>
+                          <p:cTn id="11" fill="hold">
+                            <p:stCondLst>
+                              <p:cond delay="0"/>
+                            </p:stCondLst>
+                            <p:childTnLst>
+                              <p:par>
+                                <p:cTn id="12" presetID="2" presetClass="entr" presetSubtype="4" fill="hold" nodeType="clickEffect">
+                                  <p:stCondLst>
+                                    <p:cond delay="0"/>
+                                  </p:stCondLst>
+                                  <p:childTnLst>
+                                    <p:set>
+                                      <p:cBhvr>
+                                        <p:cTn id="13" dur="1" fill="hold">
+                                          <p:stCondLst>
+                                            <p:cond delay="0"/>
+                                          </p:stCondLst>
+                                        </p:cTn>
+                                        <p:tgtEl>
+                                          <p:spTgt spid="2"/>
+                                        </p:tgtEl>
+                                        <p:attrNameLst>
+                                          <p:attrName>style.visibility</p:attrName>
+                                        </p:attrNameLst>
+                                      </p:cBhvr>
+                                      <p:to>
+                                        <p:strVal val="visible"/>
+                                      </p:to>
+                                    </p:set>
+                                    <p:anim calcmode="lin" valueType="num">
+                                      <p:cBhvr additive="base">
+                                        <p:cTn id="14" dur="500" fill="hold"/>
+                                        <p:tgtEl>
+                                          <p:spTgt spid="2"/>
+                                        </p:tgtEl>
+                                        <p:attrNameLst>
+                                          <p:attrName>ppt_x</p:attrName>
+                                        </p:attrNameLst>
+                                      </p:cBhvr>
+                                      <p:tavLst>
+                                        <p:tav tm="0">
+                                          <p:val>
+                                            <p:strVal val="#ppt_x"/>
+                                          </p:val>
+                                        </p:tav>
+                                        <p:tav tm="100000">
+                                          <p:val>
+                                            <p:strVal val="#ppt_x"/>
+                                          </p:val>
+                                        </p:tav>
+                                      </p:tavLst>
+                                    </p:anim>
+                                    <p:anim calcmode="lin" valueType="num">
+                                      <p:cBhvr additive="base">
+                                        <p:cTn id="15" dur="500" fill="hold"/>
+                                        <p:tgtEl>
+                                          <p:spTgt spid="2"/>
+                                        </p:tgtEl>
+                                        <p:attrNameLst>
+                                          <p:attrName>ppt_y</p:attrName>
+                                        </p:attrNameLst>
+                                      </p:cBhvr>
+                                      <p:tavLst>
+                                        <p:tav tm="0">
+                                          <p:val>
+                                            <p:strVal val="1+#ppt_h/2"/>
+                                          </p:val>
+                                        </p:tav>
+                                        <p:tav tm="100000">
+                                          <p:val>
+                                            <p:strVal val="#ppt_y"/>
+                                          </p:val>
+                                        </p:tav>
+                                      </p:tavLst>
+                                    </p:anim>
+                                  </p:childTnLst>
+                                </p:cTn>
+                              </p:par>
+                            </p:childTnLst>
+                          </p:cTn>
+                        </p:par>
+                      </p:childTnLst>
+                    </p:cTn>
+                  </p:par>
+                  <p:par>
+                    <p:cTn id="16" fill="hold">
+                      <p:stCondLst>
+                        <p:cond delay="indefinite"/>
+                      </p:stCondLst>
+                      <p:childTnLst>
+                        <p:par>
+                          <p:cTn id="17" fill="hold">
+                            <p:stCondLst>
+                              <p:cond delay="0"/>
+                            </p:stCondLst>
+                            <p:childTnLst>
+                              <p:par>
+                                <p:cTn id="18" presetID="10" presetClass="entr" presetSubtype="0" fill="hold" grpId="0" nodeType="clickEffect">
+                                  <p:stCondLst>
+                                    <p:cond delay="0"/>
+                                  </p:stCondLst>
+                                  <p:childTnLst>
+                                    <p:set>
+                                      <p:cBhvr>
+                                        <p:cTn id="19" dur="1" fill="hold">
+                                          <p:stCondLst>
+                                            <p:cond delay="0"/>
+                                          </p:stCondLst>
+                                        </p:cTn>
+                                        <p:tgtEl>
+                                          <p:spTgt spid="8"/>
+                                        </p:tgtEl>
+                                        <p:attrNameLst>
+                                          <p:attrName>style.visibility</p:attrName>
+                                        </p:attrNameLst>
+                                      </p:cBhvr>
+                                      <p:to>
+                                        <p:strVal val="visible"/>
+                                      </p:to>
+                                    </p:set>
+                                    <p:animEffect transition="in" filter="fade">
+                                      <p:cBhvr>
+                                        <p:cTn id="20" dur="500"/>
+                                        <p:tgtEl>
+                                          <p:spTgt spid="8"/>
+                                        </p:tgtEl>
+                                      </p:cBhvr>
+                                    </p:animEffect>
+                                  </p:childTnLst>
+                                </p:cTn>
+                              </p:par>
+                            </p:childTnLst>
+                          </p:cTn>
+                        </p:par>
+                      </p:childTnLst>
+                    </p:cTn>
+                  </p:par>
+                  <p:par>
+                    <p:cTn id="21" fill="hold">
+                      <p:stCondLst>
+                        <p:cond delay="indefinite"/>
+                      </p:stCondLst>
+                      <p:childTnLst>
+                        <p:par>
+                          <p:cTn id="22" fill="hold">
+                            <p:stCondLst>
+                              <p:cond delay="0"/>
+                            </p:stCondLst>
+                            <p:childTnLst>
+                              <p:par>
+                                <p:cTn id="23" presetID="10" presetClass="entr" presetSubtype="0" fill="hold" nodeType="clickEffect">
+                                  <p:stCondLst>
+                                    <p:cond delay="0"/>
+                                  </p:stCondLst>
+                                  <p:childTnLst>
+                                    <p:set>
+                                      <p:cBhvr>
+                                        <p:cTn id="24" dur="1" fill="hold">
+                                          <p:stCondLst>
+                                            <p:cond delay="0"/>
+                                          </p:stCondLst>
+                                        </p:cTn>
+                                        <p:tgtEl>
+                                          <p:spTgt spid="3"/>
+                                        </p:tgtEl>
+                                        <p:attrNameLst>
+                                          <p:attrName>style.visibility</p:attrName>
+                                        </p:attrNameLst>
+                                      </p:cBhvr>
+                                      <p:to>
+                                        <p:strVal val="visible"/>
+                                      </p:to>
+                                    </p:set>
+                                    <p:animEffect transition="in" filter="fade">
+                                      <p:cBhvr>
+                                        <p:cTn id="25" dur="500"/>
+                                        <p:tgtEl>
+                                          <p:spTgt spid="3"/>
+                                        </p:tgtEl>
+                                      </p:cBhvr>
+                                    </p:animEffect>
+                                  </p:childTnLst>
+                                </p:cTn>
+                              </p:par>
+                            </p:childTnLst>
+                          </p:cTn>
+                        </p:par>
+                      </p:childTnLst>
+                    </p:cTn>
+                  </p:par>
+                  <p:par>
+                    <p:cTn id="26" fill="hold">
+                      <p:stCondLst>
+                        <p:cond delay="indefinite"/>
+                      </p:stCondLst>
+                      <p:childTnLst>
+                        <p:par>
+                          <p:cTn id="27" fill="hold">
+                            <p:stCondLst>
+                              <p:cond delay="0"/>
+                            </p:stCondLst>
+                            <p:childTnLst>
+                              <p:par>
+                                <p:cTn id="28" presetID="10" presetClass="entr" presetSubtype="0" fill="hold" grpId="0" nodeType="clickEffect">
+                                  <p:stCondLst>
+                                    <p:cond delay="0"/>
+                                  </p:stCondLst>
+                                  <p:childTnLst>
+                                    <p:set>
+                                      <p:cBhvr>
+                                        <p:cTn id="29" dur="1" fill="hold">
+                                          <p:stCondLst>
+                                            <p:cond delay="0"/>
+                                          </p:stCondLst>
+                                        </p:cTn>
+                                        <p:tgtEl>
+                                          <p:spTgt spid="9"/>
+                                        </p:tgtEl>
+                                        <p:attrNameLst>
+                                          <p:attrName>style.visibility</p:attrName>
+                                        </p:attrNameLst>
+                                      </p:cBhvr>
+                                      <p:to>
+                                        <p:strVal val="visible"/>
+                                      </p:to>
+                                    </p:set>
+                                    <p:animEffect transition="in" filter="fade">
+                                      <p:cBhvr>
+                                        <p:cTn id="30" dur="500"/>
+                                        <p:tgtEl>
+                                          <p:spTgt spid="9"/>
+                                        </p:tgtEl>
+                                      </p:cBhvr>
+                                    </p:animEffect>
+                                  </p:childTnLst>
+                                </p:cTn>
+                              </p:par>
+                            </p:childTnLst>
+                          </p:cTn>
+                        </p:par>
+                      </p:childTnLst>
+                    </p:cTn>
+                  </p:par>
+                </p:childTnLst>
+              </p:cTn>
+              <p:prevCondLst>
+                <p:cond evt="onPrev" delay="0">
+                  <p:tgtEl>
+                    <p:sldTgt/>
+                  </p:tgtEl>
+                </p:cond>
+              </p:prevCondLst>
+              <p:nextCondLst>
+                <p:cond evt="onNext" delay="0">
+                  <p:tgtEl>
+                    <p:sldTgt/>
+                  </p:tgtEl>
+                </p:cond>
+              </p:nextCondLst>
+            </p:seq>
+          </p:childTnLst>
+        </p:cTn>
       </p:par>
     </p:tnLst>
+    <p:bldLst>
+      <p:bldP spid="4" grpId="0"/>
+      <p:bldP spid="8" grpId="0" animBg="1"/>
+      <p:bldP spid="9" grpId="0"/>
+    </p:bldLst>
   </p:timing>
 </p:sld>
 </file>
@@ -13562,42 +14221,6 @@
           <a:chExt cx="0" cy="0"/>
         </a:xfrm>
       </p:grpSpPr>
-      <p:pic>
-        <p:nvPicPr>
-          <p:cNvPr id="6" name="Picture 5"/>
-          <p:cNvPicPr>
-            <a:picLocks noChangeAspect="1"/>
-          </p:cNvPicPr>
-          <p:nvPr/>
-        </p:nvPicPr>
-        <p:blipFill>
-          <a:blip r:embed="rId2">
-            <a:extLst>
-              <a:ext uri="{28A0092B-C50C-407E-A947-70E740481C1C}">
-                <a14:useLocalDpi xmlns:a14="http://schemas.microsoft.com/office/drawing/2010/main" val="0"/>
-              </a:ext>
-            </a:extLst>
-          </a:blip>
-          <a:stretch>
-            <a:fillRect/>
-          </a:stretch>
-        </p:blipFill>
-        <p:spPr>
-          <a:xfrm>
-            <a:off x="1390261" y="1175658"/>
-            <a:ext cx="9265298" cy="5225141"/>
-          </a:xfrm>
-          <a:prstGeom prst="ellipse">
-            <a:avLst/>
-          </a:prstGeom>
-          <a:ln>
-            <a:noFill/>
-          </a:ln>
-          <a:effectLst>
-            <a:softEdge rad="112500"/>
-          </a:effectLst>
-        </p:spPr>
-      </p:pic>
       <p:sp>
         <p:nvSpPr>
           <p:cNvPr id="7" name="Title 1"/>
@@ -13656,6 +14279,898 @@
           </a:p>
         </p:txBody>
       </p:sp>
+      <p:sp>
+        <p:nvSpPr>
+          <p:cNvPr id="4" name="Subtitle 2"/>
+          <p:cNvSpPr txBox="1">
+            <a:spLocks/>
+          </p:cNvSpPr>
+          <p:nvPr/>
+        </p:nvSpPr>
+        <p:spPr>
+          <a:xfrm>
+            <a:off x="511314" y="931495"/>
+            <a:ext cx="10076918" cy="1452786"/>
+          </a:xfrm>
+          <a:prstGeom prst="rect">
+            <a:avLst/>
+          </a:prstGeom>
+        </p:spPr>
+        <p:txBody>
+          <a:bodyPr vert="horz" lIns="91440" tIns="45720" rIns="91440" bIns="45720" rtlCol="0">
+            <a:noAutofit/>
+          </a:bodyPr>
+          <a:lstStyle>
+            <a:lvl1pPr marL="228600" indent="-228600" algn="l" defTabSz="914400" rtl="0" eaLnBrk="1" latinLnBrk="0" hangingPunct="1">
+              <a:lnSpc>
+                <a:spcPct val="120000"/>
+              </a:lnSpc>
+              <a:spcBef>
+                <a:spcPts val="1000"/>
+              </a:spcBef>
+              <a:buSzPct val="125000"/>
+              <a:buFont typeface="Arial" panose="020B0604020202020204" pitchFamily="34" charset="0"/>
+              <a:buChar char="•"/>
+              <a:defRPr sz="2400" kern="1200">
+                <a:solidFill>
+                  <a:schemeClr val="tx1"/>
+                </a:solidFill>
+                <a:latin typeface="+mn-lt"/>
+                <a:ea typeface="+mn-ea"/>
+                <a:cs typeface="+mn-cs"/>
+              </a:defRPr>
+            </a:lvl1pPr>
+            <a:lvl2pPr marL="685800" indent="-228600" algn="l" defTabSz="914400" rtl="0" eaLnBrk="1" latinLnBrk="0" hangingPunct="1">
+              <a:lnSpc>
+                <a:spcPct val="120000"/>
+              </a:lnSpc>
+              <a:spcBef>
+                <a:spcPts val="500"/>
+              </a:spcBef>
+              <a:buSzPct val="125000"/>
+              <a:buFont typeface="Arial" panose="020B0604020202020204" pitchFamily="34" charset="0"/>
+              <a:buChar char="•"/>
+              <a:defRPr sz="2000" kern="1200">
+                <a:solidFill>
+                  <a:schemeClr val="tx1"/>
+                </a:solidFill>
+                <a:latin typeface="+mn-lt"/>
+                <a:ea typeface="+mn-ea"/>
+                <a:cs typeface="+mn-cs"/>
+              </a:defRPr>
+            </a:lvl2pPr>
+            <a:lvl3pPr marL="1143000" indent="-228600" algn="l" defTabSz="914400" rtl="0" eaLnBrk="1" latinLnBrk="0" hangingPunct="1">
+              <a:lnSpc>
+                <a:spcPct val="120000"/>
+              </a:lnSpc>
+              <a:spcBef>
+                <a:spcPts val="500"/>
+              </a:spcBef>
+              <a:buSzPct val="125000"/>
+              <a:buFont typeface="Arial" panose="020B0604020202020204" pitchFamily="34" charset="0"/>
+              <a:buChar char="•"/>
+              <a:defRPr sz="1800" kern="1200">
+                <a:solidFill>
+                  <a:schemeClr val="tx1"/>
+                </a:solidFill>
+                <a:latin typeface="+mn-lt"/>
+                <a:ea typeface="+mn-ea"/>
+                <a:cs typeface="+mn-cs"/>
+              </a:defRPr>
+            </a:lvl3pPr>
+            <a:lvl4pPr marL="1600200" indent="-228600" algn="l" defTabSz="914400" rtl="0" eaLnBrk="1" latinLnBrk="0" hangingPunct="1">
+              <a:lnSpc>
+                <a:spcPct val="120000"/>
+              </a:lnSpc>
+              <a:spcBef>
+                <a:spcPts val="500"/>
+              </a:spcBef>
+              <a:buSzPct val="125000"/>
+              <a:buFont typeface="Arial" panose="020B0604020202020204" pitchFamily="34" charset="0"/>
+              <a:buChar char="•"/>
+              <a:defRPr sz="1600" kern="1200">
+                <a:solidFill>
+                  <a:schemeClr val="tx1"/>
+                </a:solidFill>
+                <a:latin typeface="+mn-lt"/>
+                <a:ea typeface="+mn-ea"/>
+                <a:cs typeface="+mn-cs"/>
+              </a:defRPr>
+            </a:lvl4pPr>
+            <a:lvl5pPr marL="2057400" indent="-228600" algn="l" defTabSz="914400" rtl="0" eaLnBrk="1" latinLnBrk="0" hangingPunct="1">
+              <a:lnSpc>
+                <a:spcPct val="120000"/>
+              </a:lnSpc>
+              <a:spcBef>
+                <a:spcPts val="500"/>
+              </a:spcBef>
+              <a:buSzPct val="125000"/>
+              <a:buFont typeface="Arial" panose="020B0604020202020204" pitchFamily="34" charset="0"/>
+              <a:buChar char="•"/>
+              <a:defRPr sz="1600" kern="1200">
+                <a:solidFill>
+                  <a:schemeClr val="tx1"/>
+                </a:solidFill>
+                <a:latin typeface="+mn-lt"/>
+                <a:ea typeface="+mn-ea"/>
+                <a:cs typeface="+mn-cs"/>
+              </a:defRPr>
+            </a:lvl5pPr>
+            <a:lvl6pPr marL="2514600" indent="-228600" algn="l" defTabSz="914400" rtl="0" eaLnBrk="1" latinLnBrk="0" hangingPunct="1">
+              <a:lnSpc>
+                <a:spcPct val="120000"/>
+              </a:lnSpc>
+              <a:spcBef>
+                <a:spcPts val="500"/>
+              </a:spcBef>
+              <a:buSzPct val="125000"/>
+              <a:buFont typeface="Arial" panose="020B0604020202020204" pitchFamily="34" charset="0"/>
+              <a:buChar char="•"/>
+              <a:defRPr sz="1400" kern="1200">
+                <a:solidFill>
+                  <a:schemeClr val="tx1"/>
+                </a:solidFill>
+                <a:latin typeface="+mn-lt"/>
+                <a:ea typeface="+mn-ea"/>
+                <a:cs typeface="+mn-cs"/>
+              </a:defRPr>
+            </a:lvl6pPr>
+            <a:lvl7pPr marL="2971800" indent="-228600" algn="l" defTabSz="914400" rtl="0" eaLnBrk="1" latinLnBrk="0" hangingPunct="1">
+              <a:lnSpc>
+                <a:spcPct val="120000"/>
+              </a:lnSpc>
+              <a:spcBef>
+                <a:spcPts val="500"/>
+              </a:spcBef>
+              <a:buSzPct val="125000"/>
+              <a:buFont typeface="Arial" panose="020B0604020202020204" pitchFamily="34" charset="0"/>
+              <a:buChar char="•"/>
+              <a:defRPr sz="1400" kern="1200">
+                <a:solidFill>
+                  <a:schemeClr val="tx1"/>
+                </a:solidFill>
+                <a:latin typeface="+mn-lt"/>
+                <a:ea typeface="+mn-ea"/>
+                <a:cs typeface="+mn-cs"/>
+              </a:defRPr>
+            </a:lvl7pPr>
+            <a:lvl8pPr marL="3429000" indent="-228600" algn="l" defTabSz="914400" rtl="0" eaLnBrk="1" latinLnBrk="0" hangingPunct="1">
+              <a:lnSpc>
+                <a:spcPct val="120000"/>
+              </a:lnSpc>
+              <a:spcBef>
+                <a:spcPts val="500"/>
+              </a:spcBef>
+              <a:buSzPct val="125000"/>
+              <a:buFont typeface="Arial" panose="020B0604020202020204" pitchFamily="34" charset="0"/>
+              <a:buChar char="•"/>
+              <a:defRPr sz="1400" kern="1200">
+                <a:solidFill>
+                  <a:schemeClr val="tx1"/>
+                </a:solidFill>
+                <a:latin typeface="+mn-lt"/>
+                <a:ea typeface="+mn-ea"/>
+                <a:cs typeface="+mn-cs"/>
+              </a:defRPr>
+            </a:lvl8pPr>
+            <a:lvl9pPr marL="3886200" indent="-228600" algn="l" defTabSz="914400" rtl="0" eaLnBrk="1" latinLnBrk="0" hangingPunct="1">
+              <a:lnSpc>
+                <a:spcPct val="120000"/>
+              </a:lnSpc>
+              <a:spcBef>
+                <a:spcPts val="500"/>
+              </a:spcBef>
+              <a:buSzPct val="125000"/>
+              <a:buFont typeface="Arial" panose="020B0604020202020204" pitchFamily="34" charset="0"/>
+              <a:buChar char="•"/>
+              <a:defRPr sz="1400" kern="1200">
+                <a:solidFill>
+                  <a:schemeClr val="tx1"/>
+                </a:solidFill>
+                <a:latin typeface="+mn-lt"/>
+                <a:ea typeface="+mn-ea"/>
+                <a:cs typeface="+mn-cs"/>
+              </a:defRPr>
+            </a:lvl9pPr>
+          </a:lstStyle>
+          <a:p>
+            <a:r>
+              <a:rPr lang="en-IE" dirty="0" smtClean="0"/>
+              <a:t>Exploring the data – Kaggle Wine Quality dataset. </a:t>
+            </a:r>
+          </a:p>
+          <a:p>
+            <a:r>
+              <a:rPr lang="en-IE" dirty="0" smtClean="0"/>
+              <a:t>1600 rows x 12 columns.</a:t>
+            </a:r>
+          </a:p>
+          <a:p>
+            <a:r>
+              <a:rPr lang="en-IE" dirty="0" smtClean="0"/>
+              <a:t>‘Clean’ dataset – no missing rows, or ‘bad’ data.</a:t>
+            </a:r>
+            <a:endParaRPr lang="en-IE" dirty="0" smtClean="0"/>
+          </a:p>
+          <a:p>
+            <a:endParaRPr lang="en-IE" dirty="0" smtClean="0"/>
+          </a:p>
+        </p:txBody>
+      </p:sp>
+      <p:sp>
+        <p:nvSpPr>
+          <p:cNvPr id="5" name="Subtitle 2"/>
+          <p:cNvSpPr txBox="1">
+            <a:spLocks/>
+          </p:cNvSpPr>
+          <p:nvPr/>
+        </p:nvSpPr>
+        <p:spPr>
+          <a:xfrm>
+            <a:off x="5868955" y="3459624"/>
+            <a:ext cx="6206252" cy="1394387"/>
+          </a:xfrm>
+          <a:prstGeom prst="rect">
+            <a:avLst/>
+          </a:prstGeom>
+        </p:spPr>
+        <p:txBody>
+          <a:bodyPr vert="horz" lIns="91440" tIns="45720" rIns="91440" bIns="45720" rtlCol="0">
+            <a:noAutofit/>
+          </a:bodyPr>
+          <a:lstStyle>
+            <a:lvl1pPr marL="228600" indent="-228600" algn="l" defTabSz="914400" rtl="0" eaLnBrk="1" latinLnBrk="0" hangingPunct="1">
+              <a:lnSpc>
+                <a:spcPct val="120000"/>
+              </a:lnSpc>
+              <a:spcBef>
+                <a:spcPts val="1000"/>
+              </a:spcBef>
+              <a:buSzPct val="125000"/>
+              <a:buFont typeface="Arial" panose="020B0604020202020204" pitchFamily="34" charset="0"/>
+              <a:buChar char="•"/>
+              <a:defRPr sz="2400" kern="1200">
+                <a:solidFill>
+                  <a:schemeClr val="tx1"/>
+                </a:solidFill>
+                <a:latin typeface="+mn-lt"/>
+                <a:ea typeface="+mn-ea"/>
+                <a:cs typeface="+mn-cs"/>
+              </a:defRPr>
+            </a:lvl1pPr>
+            <a:lvl2pPr marL="685800" indent="-228600" algn="l" defTabSz="914400" rtl="0" eaLnBrk="1" latinLnBrk="0" hangingPunct="1">
+              <a:lnSpc>
+                <a:spcPct val="120000"/>
+              </a:lnSpc>
+              <a:spcBef>
+                <a:spcPts val="500"/>
+              </a:spcBef>
+              <a:buSzPct val="125000"/>
+              <a:buFont typeface="Arial" panose="020B0604020202020204" pitchFamily="34" charset="0"/>
+              <a:buChar char="•"/>
+              <a:defRPr sz="2000" kern="1200">
+                <a:solidFill>
+                  <a:schemeClr val="tx1"/>
+                </a:solidFill>
+                <a:latin typeface="+mn-lt"/>
+                <a:ea typeface="+mn-ea"/>
+                <a:cs typeface="+mn-cs"/>
+              </a:defRPr>
+            </a:lvl2pPr>
+            <a:lvl3pPr marL="1143000" indent="-228600" algn="l" defTabSz="914400" rtl="0" eaLnBrk="1" latinLnBrk="0" hangingPunct="1">
+              <a:lnSpc>
+                <a:spcPct val="120000"/>
+              </a:lnSpc>
+              <a:spcBef>
+                <a:spcPts val="500"/>
+              </a:spcBef>
+              <a:buSzPct val="125000"/>
+              <a:buFont typeface="Arial" panose="020B0604020202020204" pitchFamily="34" charset="0"/>
+              <a:buChar char="•"/>
+              <a:defRPr sz="1800" kern="1200">
+                <a:solidFill>
+                  <a:schemeClr val="tx1"/>
+                </a:solidFill>
+                <a:latin typeface="+mn-lt"/>
+                <a:ea typeface="+mn-ea"/>
+                <a:cs typeface="+mn-cs"/>
+              </a:defRPr>
+            </a:lvl3pPr>
+            <a:lvl4pPr marL="1600200" indent="-228600" algn="l" defTabSz="914400" rtl="0" eaLnBrk="1" latinLnBrk="0" hangingPunct="1">
+              <a:lnSpc>
+                <a:spcPct val="120000"/>
+              </a:lnSpc>
+              <a:spcBef>
+                <a:spcPts val="500"/>
+              </a:spcBef>
+              <a:buSzPct val="125000"/>
+              <a:buFont typeface="Arial" panose="020B0604020202020204" pitchFamily="34" charset="0"/>
+              <a:buChar char="•"/>
+              <a:defRPr sz="1600" kern="1200">
+                <a:solidFill>
+                  <a:schemeClr val="tx1"/>
+                </a:solidFill>
+                <a:latin typeface="+mn-lt"/>
+                <a:ea typeface="+mn-ea"/>
+                <a:cs typeface="+mn-cs"/>
+              </a:defRPr>
+            </a:lvl4pPr>
+            <a:lvl5pPr marL="2057400" indent="-228600" algn="l" defTabSz="914400" rtl="0" eaLnBrk="1" latinLnBrk="0" hangingPunct="1">
+              <a:lnSpc>
+                <a:spcPct val="120000"/>
+              </a:lnSpc>
+              <a:spcBef>
+                <a:spcPts val="500"/>
+              </a:spcBef>
+              <a:buSzPct val="125000"/>
+              <a:buFont typeface="Arial" panose="020B0604020202020204" pitchFamily="34" charset="0"/>
+              <a:buChar char="•"/>
+              <a:defRPr sz="1600" kern="1200">
+                <a:solidFill>
+                  <a:schemeClr val="tx1"/>
+                </a:solidFill>
+                <a:latin typeface="+mn-lt"/>
+                <a:ea typeface="+mn-ea"/>
+                <a:cs typeface="+mn-cs"/>
+              </a:defRPr>
+            </a:lvl5pPr>
+            <a:lvl6pPr marL="2514600" indent="-228600" algn="l" defTabSz="914400" rtl="0" eaLnBrk="1" latinLnBrk="0" hangingPunct="1">
+              <a:lnSpc>
+                <a:spcPct val="120000"/>
+              </a:lnSpc>
+              <a:spcBef>
+                <a:spcPts val="500"/>
+              </a:spcBef>
+              <a:buSzPct val="125000"/>
+              <a:buFont typeface="Arial" panose="020B0604020202020204" pitchFamily="34" charset="0"/>
+              <a:buChar char="•"/>
+              <a:defRPr sz="1400" kern="1200">
+                <a:solidFill>
+                  <a:schemeClr val="tx1"/>
+                </a:solidFill>
+                <a:latin typeface="+mn-lt"/>
+                <a:ea typeface="+mn-ea"/>
+                <a:cs typeface="+mn-cs"/>
+              </a:defRPr>
+            </a:lvl6pPr>
+            <a:lvl7pPr marL="2971800" indent="-228600" algn="l" defTabSz="914400" rtl="0" eaLnBrk="1" latinLnBrk="0" hangingPunct="1">
+              <a:lnSpc>
+                <a:spcPct val="120000"/>
+              </a:lnSpc>
+              <a:spcBef>
+                <a:spcPts val="500"/>
+              </a:spcBef>
+              <a:buSzPct val="125000"/>
+              <a:buFont typeface="Arial" panose="020B0604020202020204" pitchFamily="34" charset="0"/>
+              <a:buChar char="•"/>
+              <a:defRPr sz="1400" kern="1200">
+                <a:solidFill>
+                  <a:schemeClr val="tx1"/>
+                </a:solidFill>
+                <a:latin typeface="+mn-lt"/>
+                <a:ea typeface="+mn-ea"/>
+                <a:cs typeface="+mn-cs"/>
+              </a:defRPr>
+            </a:lvl7pPr>
+            <a:lvl8pPr marL="3429000" indent="-228600" algn="l" defTabSz="914400" rtl="0" eaLnBrk="1" latinLnBrk="0" hangingPunct="1">
+              <a:lnSpc>
+                <a:spcPct val="120000"/>
+              </a:lnSpc>
+              <a:spcBef>
+                <a:spcPts val="500"/>
+              </a:spcBef>
+              <a:buSzPct val="125000"/>
+              <a:buFont typeface="Arial" panose="020B0604020202020204" pitchFamily="34" charset="0"/>
+              <a:buChar char="•"/>
+              <a:defRPr sz="1400" kern="1200">
+                <a:solidFill>
+                  <a:schemeClr val="tx1"/>
+                </a:solidFill>
+                <a:latin typeface="+mn-lt"/>
+                <a:ea typeface="+mn-ea"/>
+                <a:cs typeface="+mn-cs"/>
+              </a:defRPr>
+            </a:lvl8pPr>
+            <a:lvl9pPr marL="3886200" indent="-228600" algn="l" defTabSz="914400" rtl="0" eaLnBrk="1" latinLnBrk="0" hangingPunct="1">
+              <a:lnSpc>
+                <a:spcPct val="120000"/>
+              </a:lnSpc>
+              <a:spcBef>
+                <a:spcPts val="500"/>
+              </a:spcBef>
+              <a:buSzPct val="125000"/>
+              <a:buFont typeface="Arial" panose="020B0604020202020204" pitchFamily="34" charset="0"/>
+              <a:buChar char="•"/>
+              <a:defRPr sz="1400" kern="1200">
+                <a:solidFill>
+                  <a:schemeClr val="tx1"/>
+                </a:solidFill>
+                <a:latin typeface="+mn-lt"/>
+                <a:ea typeface="+mn-ea"/>
+                <a:cs typeface="+mn-cs"/>
+              </a:defRPr>
+            </a:lvl9pPr>
+          </a:lstStyle>
+          <a:p>
+            <a:r>
+              <a:rPr lang="en-IE" dirty="0" smtClean="0"/>
+              <a:t>Attributes vary in importance for ‘quality’.</a:t>
+            </a:r>
+          </a:p>
+          <a:p>
+            <a:r>
+              <a:rPr lang="en-IE" dirty="0" smtClean="0"/>
+              <a:t>Some correlation between features. Options to ‘prune’ feature list.</a:t>
+            </a:r>
+            <a:endParaRPr lang="en-IE" dirty="0" smtClean="0"/>
+          </a:p>
+          <a:p>
+            <a:endParaRPr lang="en-IE" dirty="0" smtClean="0"/>
+          </a:p>
+        </p:txBody>
+      </p:sp>
+      <p:sp>
+        <p:nvSpPr>
+          <p:cNvPr id="8" name="Subtitle 2"/>
+          <p:cNvSpPr txBox="1">
+            <a:spLocks/>
+          </p:cNvSpPr>
+          <p:nvPr/>
+        </p:nvSpPr>
+        <p:spPr>
+          <a:xfrm>
+            <a:off x="536951" y="5618857"/>
+            <a:ext cx="9726548" cy="740636"/>
+          </a:xfrm>
+          <a:prstGeom prst="rect">
+            <a:avLst/>
+          </a:prstGeom>
+        </p:spPr>
+        <p:txBody>
+          <a:bodyPr vert="horz" lIns="91440" tIns="45720" rIns="91440" bIns="45720" rtlCol="0">
+            <a:noAutofit/>
+          </a:bodyPr>
+          <a:lstStyle>
+            <a:lvl1pPr marL="228600" indent="-228600" algn="l" defTabSz="914400" rtl="0" eaLnBrk="1" latinLnBrk="0" hangingPunct="1">
+              <a:lnSpc>
+                <a:spcPct val="120000"/>
+              </a:lnSpc>
+              <a:spcBef>
+                <a:spcPts val="1000"/>
+              </a:spcBef>
+              <a:buSzPct val="125000"/>
+              <a:buFont typeface="Arial" panose="020B0604020202020204" pitchFamily="34" charset="0"/>
+              <a:buChar char="•"/>
+              <a:defRPr sz="2400" kern="1200">
+                <a:solidFill>
+                  <a:schemeClr val="tx1"/>
+                </a:solidFill>
+                <a:latin typeface="+mn-lt"/>
+                <a:ea typeface="+mn-ea"/>
+                <a:cs typeface="+mn-cs"/>
+              </a:defRPr>
+            </a:lvl1pPr>
+            <a:lvl2pPr marL="685800" indent="-228600" algn="l" defTabSz="914400" rtl="0" eaLnBrk="1" latinLnBrk="0" hangingPunct="1">
+              <a:lnSpc>
+                <a:spcPct val="120000"/>
+              </a:lnSpc>
+              <a:spcBef>
+                <a:spcPts val="500"/>
+              </a:spcBef>
+              <a:buSzPct val="125000"/>
+              <a:buFont typeface="Arial" panose="020B0604020202020204" pitchFamily="34" charset="0"/>
+              <a:buChar char="•"/>
+              <a:defRPr sz="2000" kern="1200">
+                <a:solidFill>
+                  <a:schemeClr val="tx1"/>
+                </a:solidFill>
+                <a:latin typeface="+mn-lt"/>
+                <a:ea typeface="+mn-ea"/>
+                <a:cs typeface="+mn-cs"/>
+              </a:defRPr>
+            </a:lvl2pPr>
+            <a:lvl3pPr marL="1143000" indent="-228600" algn="l" defTabSz="914400" rtl="0" eaLnBrk="1" latinLnBrk="0" hangingPunct="1">
+              <a:lnSpc>
+                <a:spcPct val="120000"/>
+              </a:lnSpc>
+              <a:spcBef>
+                <a:spcPts val="500"/>
+              </a:spcBef>
+              <a:buSzPct val="125000"/>
+              <a:buFont typeface="Arial" panose="020B0604020202020204" pitchFamily="34" charset="0"/>
+              <a:buChar char="•"/>
+              <a:defRPr sz="1800" kern="1200">
+                <a:solidFill>
+                  <a:schemeClr val="tx1"/>
+                </a:solidFill>
+                <a:latin typeface="+mn-lt"/>
+                <a:ea typeface="+mn-ea"/>
+                <a:cs typeface="+mn-cs"/>
+              </a:defRPr>
+            </a:lvl3pPr>
+            <a:lvl4pPr marL="1600200" indent="-228600" algn="l" defTabSz="914400" rtl="0" eaLnBrk="1" latinLnBrk="0" hangingPunct="1">
+              <a:lnSpc>
+                <a:spcPct val="120000"/>
+              </a:lnSpc>
+              <a:spcBef>
+                <a:spcPts val="500"/>
+              </a:spcBef>
+              <a:buSzPct val="125000"/>
+              <a:buFont typeface="Arial" panose="020B0604020202020204" pitchFamily="34" charset="0"/>
+              <a:buChar char="•"/>
+              <a:defRPr sz="1600" kern="1200">
+                <a:solidFill>
+                  <a:schemeClr val="tx1"/>
+                </a:solidFill>
+                <a:latin typeface="+mn-lt"/>
+                <a:ea typeface="+mn-ea"/>
+                <a:cs typeface="+mn-cs"/>
+              </a:defRPr>
+            </a:lvl4pPr>
+            <a:lvl5pPr marL="2057400" indent="-228600" algn="l" defTabSz="914400" rtl="0" eaLnBrk="1" latinLnBrk="0" hangingPunct="1">
+              <a:lnSpc>
+                <a:spcPct val="120000"/>
+              </a:lnSpc>
+              <a:spcBef>
+                <a:spcPts val="500"/>
+              </a:spcBef>
+              <a:buSzPct val="125000"/>
+              <a:buFont typeface="Arial" panose="020B0604020202020204" pitchFamily="34" charset="0"/>
+              <a:buChar char="•"/>
+              <a:defRPr sz="1600" kern="1200">
+                <a:solidFill>
+                  <a:schemeClr val="tx1"/>
+                </a:solidFill>
+                <a:latin typeface="+mn-lt"/>
+                <a:ea typeface="+mn-ea"/>
+                <a:cs typeface="+mn-cs"/>
+              </a:defRPr>
+            </a:lvl5pPr>
+            <a:lvl6pPr marL="2514600" indent="-228600" algn="l" defTabSz="914400" rtl="0" eaLnBrk="1" latinLnBrk="0" hangingPunct="1">
+              <a:lnSpc>
+                <a:spcPct val="120000"/>
+              </a:lnSpc>
+              <a:spcBef>
+                <a:spcPts val="500"/>
+              </a:spcBef>
+              <a:buSzPct val="125000"/>
+              <a:buFont typeface="Arial" panose="020B0604020202020204" pitchFamily="34" charset="0"/>
+              <a:buChar char="•"/>
+              <a:defRPr sz="1400" kern="1200">
+                <a:solidFill>
+                  <a:schemeClr val="tx1"/>
+                </a:solidFill>
+                <a:latin typeface="+mn-lt"/>
+                <a:ea typeface="+mn-ea"/>
+                <a:cs typeface="+mn-cs"/>
+              </a:defRPr>
+            </a:lvl6pPr>
+            <a:lvl7pPr marL="2971800" indent="-228600" algn="l" defTabSz="914400" rtl="0" eaLnBrk="1" latinLnBrk="0" hangingPunct="1">
+              <a:lnSpc>
+                <a:spcPct val="120000"/>
+              </a:lnSpc>
+              <a:spcBef>
+                <a:spcPts val="500"/>
+              </a:spcBef>
+              <a:buSzPct val="125000"/>
+              <a:buFont typeface="Arial" panose="020B0604020202020204" pitchFamily="34" charset="0"/>
+              <a:buChar char="•"/>
+              <a:defRPr sz="1400" kern="1200">
+                <a:solidFill>
+                  <a:schemeClr val="tx1"/>
+                </a:solidFill>
+                <a:latin typeface="+mn-lt"/>
+                <a:ea typeface="+mn-ea"/>
+                <a:cs typeface="+mn-cs"/>
+              </a:defRPr>
+            </a:lvl7pPr>
+            <a:lvl8pPr marL="3429000" indent="-228600" algn="l" defTabSz="914400" rtl="0" eaLnBrk="1" latinLnBrk="0" hangingPunct="1">
+              <a:lnSpc>
+                <a:spcPct val="120000"/>
+              </a:lnSpc>
+              <a:spcBef>
+                <a:spcPts val="500"/>
+              </a:spcBef>
+              <a:buSzPct val="125000"/>
+              <a:buFont typeface="Arial" panose="020B0604020202020204" pitchFamily="34" charset="0"/>
+              <a:buChar char="•"/>
+              <a:defRPr sz="1400" kern="1200">
+                <a:solidFill>
+                  <a:schemeClr val="tx1"/>
+                </a:solidFill>
+                <a:latin typeface="+mn-lt"/>
+                <a:ea typeface="+mn-ea"/>
+                <a:cs typeface="+mn-cs"/>
+              </a:defRPr>
+            </a:lvl8pPr>
+            <a:lvl9pPr marL="3886200" indent="-228600" algn="l" defTabSz="914400" rtl="0" eaLnBrk="1" latinLnBrk="0" hangingPunct="1">
+              <a:lnSpc>
+                <a:spcPct val="120000"/>
+              </a:lnSpc>
+              <a:spcBef>
+                <a:spcPts val="500"/>
+              </a:spcBef>
+              <a:buSzPct val="125000"/>
+              <a:buFont typeface="Arial" panose="020B0604020202020204" pitchFamily="34" charset="0"/>
+              <a:buChar char="•"/>
+              <a:defRPr sz="1400" kern="1200">
+                <a:solidFill>
+                  <a:schemeClr val="tx1"/>
+                </a:solidFill>
+                <a:latin typeface="+mn-lt"/>
+                <a:ea typeface="+mn-ea"/>
+                <a:cs typeface="+mn-cs"/>
+              </a:defRPr>
+            </a:lvl9pPr>
+          </a:lstStyle>
+          <a:p>
+            <a:r>
+              <a:rPr lang="en-IE" dirty="0" smtClean="0"/>
+              <a:t>Dataset out of balance – few very poor or high quality wine entries.</a:t>
+            </a:r>
+            <a:endParaRPr lang="en-IE" dirty="0" smtClean="0"/>
+          </a:p>
+          <a:p>
+            <a:endParaRPr lang="en-IE" dirty="0" smtClean="0"/>
+          </a:p>
+        </p:txBody>
+      </p:sp>
+      <p:pic>
+        <p:nvPicPr>
+          <p:cNvPr id="2" name="Picture 1"/>
+          <p:cNvPicPr>
+            <a:picLocks noChangeAspect="1"/>
+          </p:cNvPicPr>
+          <p:nvPr/>
+        </p:nvPicPr>
+        <p:blipFill>
+          <a:blip r:embed="rId2">
+            <a:extLst>
+              <a:ext uri="{28A0092B-C50C-407E-A947-70E740481C1C}">
+                <a14:useLocalDpi xmlns:a14="http://schemas.microsoft.com/office/drawing/2010/main" val="0"/>
+              </a:ext>
+            </a:extLst>
+          </a:blip>
+          <a:stretch>
+            <a:fillRect/>
+          </a:stretch>
+        </p:blipFill>
+        <p:spPr>
+          <a:xfrm>
+            <a:off x="7255379" y="962011"/>
+            <a:ext cx="4563455" cy="1721368"/>
+          </a:xfrm>
+          <a:prstGeom prst="rect">
+            <a:avLst/>
+          </a:prstGeom>
+          <a:effectLst>
+            <a:reflection blurRad="6350" stA="52000" endA="300" endPos="35000" dir="5400000" sy="-100000" algn="bl" rotWithShape="0"/>
+          </a:effectLst>
+        </p:spPr>
+      </p:pic>
+      <p:pic>
+        <p:nvPicPr>
+          <p:cNvPr id="3" name="Picture 2"/>
+          <p:cNvPicPr>
+            <a:picLocks noChangeAspect="1"/>
+          </p:cNvPicPr>
+          <p:nvPr/>
+        </p:nvPicPr>
+        <p:blipFill>
+          <a:blip r:embed="rId3">
+            <a:extLst>
+              <a:ext uri="{28A0092B-C50C-407E-A947-70E740481C1C}">
+                <a14:useLocalDpi xmlns:a14="http://schemas.microsoft.com/office/drawing/2010/main" val="0"/>
+              </a:ext>
+            </a:extLst>
+          </a:blip>
+          <a:stretch>
+            <a:fillRect/>
+          </a:stretch>
+        </p:blipFill>
+        <p:spPr>
+          <a:xfrm>
+            <a:off x="203666" y="2493770"/>
+            <a:ext cx="3265927" cy="1112556"/>
+          </a:xfrm>
+          <a:prstGeom prst="rect">
+            <a:avLst/>
+          </a:prstGeom>
+          <a:solidFill>
+            <a:srgbClr val="FFFFFF">
+              <a:shade val="85000"/>
+            </a:srgbClr>
+          </a:solidFill>
+          <a:ln w="101600" cap="sq">
+            <a:solidFill>
+              <a:srgbClr val="FDFDFD"/>
+            </a:solidFill>
+            <a:miter lim="800000"/>
+          </a:ln>
+          <a:effectLst>
+            <a:outerShdw blurRad="57150" dist="37500" dir="7560000" sy="98000" kx="110000" ky="200000" algn="tl" rotWithShape="0">
+              <a:srgbClr val="000000">
+                <a:alpha val="20000"/>
+              </a:srgbClr>
+            </a:outerShdw>
+          </a:effectLst>
+          <a:scene3d>
+            <a:camera prst="perspectiveRelaxed">
+              <a:rot lat="18960000" lon="0" rev="0"/>
+            </a:camera>
+            <a:lightRig rig="twoPt" dir="t">
+              <a:rot lat="0" lon="0" rev="7200000"/>
+            </a:lightRig>
+          </a:scene3d>
+          <a:sp3d prstMaterial="matte">
+            <a:bevelT w="22860" h="12700"/>
+            <a:contourClr>
+              <a:srgbClr val="FFFFFF"/>
+            </a:contourClr>
+          </a:sp3d>
+        </p:spPr>
+      </p:pic>
+      <p:pic>
+        <p:nvPicPr>
+          <p:cNvPr id="9" name="Picture 8"/>
+          <p:cNvPicPr>
+            <a:picLocks noChangeAspect="1"/>
+          </p:cNvPicPr>
+          <p:nvPr/>
+        </p:nvPicPr>
+        <p:blipFill>
+          <a:blip r:embed="rId4">
+            <a:extLst>
+              <a:ext uri="{28A0092B-C50C-407E-A947-70E740481C1C}">
+                <a14:useLocalDpi xmlns:a14="http://schemas.microsoft.com/office/drawing/2010/main" val="0"/>
+              </a:ext>
+            </a:extLst>
+          </a:blip>
+          <a:stretch>
+            <a:fillRect/>
+          </a:stretch>
+        </p:blipFill>
+        <p:spPr>
+          <a:xfrm>
+            <a:off x="442946" y="3050048"/>
+            <a:ext cx="3987783" cy="1263441"/>
+          </a:xfrm>
+          <a:prstGeom prst="rect">
+            <a:avLst/>
+          </a:prstGeom>
+          <a:solidFill>
+            <a:srgbClr val="FFFFFF">
+              <a:shade val="85000"/>
+            </a:srgbClr>
+          </a:solidFill>
+          <a:ln w="101600" cap="sq">
+            <a:solidFill>
+              <a:srgbClr val="FDFDFD"/>
+            </a:solidFill>
+            <a:miter lim="800000"/>
+          </a:ln>
+          <a:effectLst>
+            <a:outerShdw blurRad="57150" dist="37500" dir="7560000" sy="98000" kx="110000" ky="200000" algn="tl" rotWithShape="0">
+              <a:srgbClr val="000000">
+                <a:alpha val="20000"/>
+              </a:srgbClr>
+            </a:outerShdw>
+          </a:effectLst>
+          <a:scene3d>
+            <a:camera prst="perspectiveRelaxed">
+              <a:rot lat="18960000" lon="0" rev="0"/>
+            </a:camera>
+            <a:lightRig rig="twoPt" dir="t">
+              <a:rot lat="0" lon="0" rev="7200000"/>
+            </a:lightRig>
+          </a:scene3d>
+          <a:sp3d prstMaterial="matte">
+            <a:bevelT w="22860" h="12700"/>
+            <a:contourClr>
+              <a:srgbClr val="FFFFFF"/>
+            </a:contourClr>
+          </a:sp3d>
+        </p:spPr>
+      </p:pic>
+      <p:pic>
+        <p:nvPicPr>
+          <p:cNvPr id="10" name="Picture 9"/>
+          <p:cNvPicPr>
+            <a:picLocks noChangeAspect="1"/>
+          </p:cNvPicPr>
+          <p:nvPr/>
+        </p:nvPicPr>
+        <p:blipFill>
+          <a:blip r:embed="rId5">
+            <a:extLst>
+              <a:ext uri="{BEBA8EAE-BF5A-486C-A8C5-ECC9F3942E4B}">
+                <a14:imgProps xmlns:a14="http://schemas.microsoft.com/office/drawing/2010/main">
+                  <a14:imgLayer r:embed="rId6">
+                    <a14:imgEffect>
+                      <a14:artisticCrisscrossEtching/>
+                    </a14:imgEffect>
+                  </a14:imgLayer>
+                </a14:imgProps>
+              </a:ext>
+              <a:ext uri="{28A0092B-C50C-407E-A947-70E740481C1C}">
+                <a14:useLocalDpi xmlns:a14="http://schemas.microsoft.com/office/drawing/2010/main" val="0"/>
+              </a:ext>
+            </a:extLst>
+          </a:blip>
+          <a:stretch>
+            <a:fillRect/>
+          </a:stretch>
+        </p:blipFill>
+        <p:spPr>
+          <a:xfrm>
+            <a:off x="2794475" y="4037176"/>
+            <a:ext cx="2797131" cy="1305987"/>
+          </a:xfrm>
+          <a:prstGeom prst="rect">
+            <a:avLst/>
+          </a:prstGeom>
+        </p:spPr>
+      </p:pic>
+      <p:pic>
+        <p:nvPicPr>
+          <p:cNvPr id="11" name="Picture 10"/>
+          <p:cNvPicPr>
+            <a:picLocks noChangeAspect="1"/>
+          </p:cNvPicPr>
+          <p:nvPr/>
+        </p:nvPicPr>
+        <p:blipFill>
+          <a:blip r:embed="rId7">
+            <a:extLst>
+              <a:ext uri="{28A0092B-C50C-407E-A947-70E740481C1C}">
+                <a14:useLocalDpi xmlns:a14="http://schemas.microsoft.com/office/drawing/2010/main" val="0"/>
+              </a:ext>
+            </a:extLst>
+          </a:blip>
+          <a:stretch>
+            <a:fillRect/>
+          </a:stretch>
+        </p:blipFill>
+        <p:spPr>
+          <a:xfrm>
+            <a:off x="9443103" y="4785644"/>
+            <a:ext cx="1768979" cy="1824527"/>
+          </a:xfrm>
+          <a:prstGeom prst="rect">
+            <a:avLst/>
+          </a:prstGeom>
+        </p:spPr>
+      </p:pic>
+      <p:pic>
+        <p:nvPicPr>
+          <p:cNvPr id="12" name="Picture 11"/>
+          <p:cNvPicPr>
+            <a:picLocks noChangeAspect="1"/>
+          </p:cNvPicPr>
+          <p:nvPr/>
+        </p:nvPicPr>
+        <p:blipFill>
+          <a:blip r:embed="rId8">
+            <a:extLst>
+              <a:ext uri="{28A0092B-C50C-407E-A947-70E740481C1C}">
+                <a14:useLocalDpi xmlns:a14="http://schemas.microsoft.com/office/drawing/2010/main" val="0"/>
+              </a:ext>
+            </a:extLst>
+          </a:blip>
+          <a:stretch>
+            <a:fillRect/>
+          </a:stretch>
+        </p:blipFill>
+        <p:spPr>
+          <a:xfrm>
+            <a:off x="8300031" y="6160092"/>
+            <a:ext cx="1237075" cy="620996"/>
+          </a:xfrm>
+          <a:prstGeom prst="rect">
+            <a:avLst/>
+          </a:prstGeom>
+        </p:spPr>
+      </p:pic>
     </p:spTree>
     <p:extLst>
       <p:ext uri="{BB962C8B-B14F-4D97-AF65-F5344CB8AC3E}">
@@ -13666,12 +15181,467 @@
   <p:clrMapOvr>
     <a:masterClrMapping/>
   </p:clrMapOvr>
+  <p:transition spd="slow">
+    <p:cover/>
+  </p:transition>
   <p:timing>
     <p:tnLst>
       <p:par>
-        <p:cTn id="1" dur="indefinite" restart="never" nodeType="tmRoot"/>
+        <p:cTn id="1" dur="indefinite" restart="never" nodeType="tmRoot">
+          <p:childTnLst>
+            <p:seq concurrent="1" nextAc="seek">
+              <p:cTn id="2" dur="indefinite" nodeType="mainSeq">
+                <p:childTnLst>
+                  <p:par>
+                    <p:cTn id="3" fill="hold">
+                      <p:stCondLst>
+                        <p:cond delay="indefinite"/>
+                      </p:stCondLst>
+                      <p:childTnLst>
+                        <p:par>
+                          <p:cTn id="4" fill="hold">
+                            <p:stCondLst>
+                              <p:cond delay="0"/>
+                            </p:stCondLst>
+                            <p:childTnLst>
+                              <p:par>
+                                <p:cTn id="5" presetID="10" presetClass="entr" presetSubtype="0" fill="hold" grpId="0" nodeType="clickEffect">
+                                  <p:stCondLst>
+                                    <p:cond delay="0"/>
+                                  </p:stCondLst>
+                                  <p:childTnLst>
+                                    <p:set>
+                                      <p:cBhvr>
+                                        <p:cTn id="6" dur="1" fill="hold">
+                                          <p:stCondLst>
+                                            <p:cond delay="0"/>
+                                          </p:stCondLst>
+                                        </p:cTn>
+                                        <p:tgtEl>
+                                          <p:spTgt spid="4"/>
+                                        </p:tgtEl>
+                                        <p:attrNameLst>
+                                          <p:attrName>style.visibility</p:attrName>
+                                        </p:attrNameLst>
+                                      </p:cBhvr>
+                                      <p:to>
+                                        <p:strVal val="visible"/>
+                                      </p:to>
+                                    </p:set>
+                                    <p:animEffect transition="in" filter="fade">
+                                      <p:cBhvr>
+                                        <p:cTn id="7" dur="500"/>
+                                        <p:tgtEl>
+                                          <p:spTgt spid="4"/>
+                                        </p:tgtEl>
+                                      </p:cBhvr>
+                                    </p:animEffect>
+                                  </p:childTnLst>
+                                </p:cTn>
+                              </p:par>
+                            </p:childTnLst>
+                          </p:cTn>
+                        </p:par>
+                      </p:childTnLst>
+                    </p:cTn>
+                  </p:par>
+                  <p:par>
+                    <p:cTn id="8" fill="hold">
+                      <p:stCondLst>
+                        <p:cond delay="indefinite"/>
+                      </p:stCondLst>
+                      <p:childTnLst>
+                        <p:par>
+                          <p:cTn id="9" fill="hold">
+                            <p:stCondLst>
+                              <p:cond delay="0"/>
+                            </p:stCondLst>
+                            <p:childTnLst>
+                              <p:par>
+                                <p:cTn id="10" presetID="10" presetClass="entr" presetSubtype="0" fill="hold" grpId="0" nodeType="clickEffect">
+                                  <p:stCondLst>
+                                    <p:cond delay="0"/>
+                                  </p:stCondLst>
+                                  <p:childTnLst>
+                                    <p:set>
+                                      <p:cBhvr>
+                                        <p:cTn id="11" dur="1" fill="hold">
+                                          <p:stCondLst>
+                                            <p:cond delay="0"/>
+                                          </p:stCondLst>
+                                        </p:cTn>
+                                        <p:tgtEl>
+                                          <p:spTgt spid="5"/>
+                                        </p:tgtEl>
+                                        <p:attrNameLst>
+                                          <p:attrName>style.visibility</p:attrName>
+                                        </p:attrNameLst>
+                                      </p:cBhvr>
+                                      <p:to>
+                                        <p:strVal val="visible"/>
+                                      </p:to>
+                                    </p:set>
+                                    <p:animEffect transition="in" filter="fade">
+                                      <p:cBhvr>
+                                        <p:cTn id="12" dur="500"/>
+                                        <p:tgtEl>
+                                          <p:spTgt spid="5"/>
+                                        </p:tgtEl>
+                                      </p:cBhvr>
+                                    </p:animEffect>
+                                  </p:childTnLst>
+                                </p:cTn>
+                              </p:par>
+                            </p:childTnLst>
+                          </p:cTn>
+                        </p:par>
+                      </p:childTnLst>
+                    </p:cTn>
+                  </p:par>
+                  <p:par>
+                    <p:cTn id="13" fill="hold">
+                      <p:stCondLst>
+                        <p:cond delay="indefinite"/>
+                      </p:stCondLst>
+                      <p:childTnLst>
+                        <p:par>
+                          <p:cTn id="14" fill="hold">
+                            <p:stCondLst>
+                              <p:cond delay="0"/>
+                            </p:stCondLst>
+                            <p:childTnLst>
+                              <p:par>
+                                <p:cTn id="15" presetID="10" presetClass="entr" presetSubtype="0" fill="hold" nodeType="clickEffect">
+                                  <p:stCondLst>
+                                    <p:cond delay="0"/>
+                                  </p:stCondLst>
+                                  <p:childTnLst>
+                                    <p:set>
+                                      <p:cBhvr>
+                                        <p:cTn id="16" dur="1" fill="hold">
+                                          <p:stCondLst>
+                                            <p:cond delay="0"/>
+                                          </p:stCondLst>
+                                        </p:cTn>
+                                        <p:tgtEl>
+                                          <p:spTgt spid="3"/>
+                                        </p:tgtEl>
+                                        <p:attrNameLst>
+                                          <p:attrName>style.visibility</p:attrName>
+                                        </p:attrNameLst>
+                                      </p:cBhvr>
+                                      <p:to>
+                                        <p:strVal val="visible"/>
+                                      </p:to>
+                                    </p:set>
+                                    <p:animEffect transition="in" filter="fade">
+                                      <p:cBhvr>
+                                        <p:cTn id="17" dur="500"/>
+                                        <p:tgtEl>
+                                          <p:spTgt spid="3"/>
+                                        </p:tgtEl>
+                                      </p:cBhvr>
+                                    </p:animEffect>
+                                  </p:childTnLst>
+                                </p:cTn>
+                              </p:par>
+                            </p:childTnLst>
+                          </p:cTn>
+                        </p:par>
+                      </p:childTnLst>
+                    </p:cTn>
+                  </p:par>
+                  <p:par>
+                    <p:cTn id="18" fill="hold">
+                      <p:stCondLst>
+                        <p:cond delay="indefinite"/>
+                      </p:stCondLst>
+                      <p:childTnLst>
+                        <p:par>
+                          <p:cTn id="19" fill="hold">
+                            <p:stCondLst>
+                              <p:cond delay="0"/>
+                            </p:stCondLst>
+                            <p:childTnLst>
+                              <p:par>
+                                <p:cTn id="20" presetID="10" presetClass="entr" presetSubtype="0" fill="hold" nodeType="clickEffect">
+                                  <p:stCondLst>
+                                    <p:cond delay="0"/>
+                                  </p:stCondLst>
+                                  <p:childTnLst>
+                                    <p:set>
+                                      <p:cBhvr>
+                                        <p:cTn id="21" dur="1" fill="hold">
+                                          <p:stCondLst>
+                                            <p:cond delay="0"/>
+                                          </p:stCondLst>
+                                        </p:cTn>
+                                        <p:tgtEl>
+                                          <p:spTgt spid="9"/>
+                                        </p:tgtEl>
+                                        <p:attrNameLst>
+                                          <p:attrName>style.visibility</p:attrName>
+                                        </p:attrNameLst>
+                                      </p:cBhvr>
+                                      <p:to>
+                                        <p:strVal val="visible"/>
+                                      </p:to>
+                                    </p:set>
+                                    <p:animEffect transition="in" filter="fade">
+                                      <p:cBhvr>
+                                        <p:cTn id="22" dur="500"/>
+                                        <p:tgtEl>
+                                          <p:spTgt spid="9"/>
+                                        </p:tgtEl>
+                                      </p:cBhvr>
+                                    </p:animEffect>
+                                  </p:childTnLst>
+                                </p:cTn>
+                              </p:par>
+                            </p:childTnLst>
+                          </p:cTn>
+                        </p:par>
+                      </p:childTnLst>
+                    </p:cTn>
+                  </p:par>
+                  <p:par>
+                    <p:cTn id="23" fill="hold">
+                      <p:stCondLst>
+                        <p:cond delay="indefinite"/>
+                      </p:stCondLst>
+                      <p:childTnLst>
+                        <p:par>
+                          <p:cTn id="24" fill="hold">
+                            <p:stCondLst>
+                              <p:cond delay="0"/>
+                            </p:stCondLst>
+                            <p:childTnLst>
+                              <p:par>
+                                <p:cTn id="25" presetID="16" presetClass="entr" presetSubtype="21" fill="hold" nodeType="clickEffect">
+                                  <p:stCondLst>
+                                    <p:cond delay="0"/>
+                                  </p:stCondLst>
+                                  <p:childTnLst>
+                                    <p:set>
+                                      <p:cBhvr>
+                                        <p:cTn id="26" dur="1" fill="hold">
+                                          <p:stCondLst>
+                                            <p:cond delay="0"/>
+                                          </p:stCondLst>
+                                        </p:cTn>
+                                        <p:tgtEl>
+                                          <p:spTgt spid="10"/>
+                                        </p:tgtEl>
+                                        <p:attrNameLst>
+                                          <p:attrName>style.visibility</p:attrName>
+                                        </p:attrNameLst>
+                                      </p:cBhvr>
+                                      <p:to>
+                                        <p:strVal val="visible"/>
+                                      </p:to>
+                                    </p:set>
+                                    <p:animEffect transition="in" filter="barn(inVertical)">
+                                      <p:cBhvr>
+                                        <p:cTn id="27" dur="500"/>
+                                        <p:tgtEl>
+                                          <p:spTgt spid="10"/>
+                                        </p:tgtEl>
+                                      </p:cBhvr>
+                                    </p:animEffect>
+                                  </p:childTnLst>
+                                </p:cTn>
+                              </p:par>
+                            </p:childTnLst>
+                          </p:cTn>
+                        </p:par>
+                      </p:childTnLst>
+                    </p:cTn>
+                  </p:par>
+                  <p:par>
+                    <p:cTn id="28" fill="hold">
+                      <p:stCondLst>
+                        <p:cond delay="indefinite"/>
+                      </p:stCondLst>
+                      <p:childTnLst>
+                        <p:par>
+                          <p:cTn id="29" fill="hold">
+                            <p:stCondLst>
+                              <p:cond delay="0"/>
+                            </p:stCondLst>
+                            <p:childTnLst>
+                              <p:par>
+                                <p:cTn id="30" presetID="10" presetClass="entr" presetSubtype="0" fill="hold" grpId="0" nodeType="clickEffect">
+                                  <p:stCondLst>
+                                    <p:cond delay="0"/>
+                                  </p:stCondLst>
+                                  <p:childTnLst>
+                                    <p:set>
+                                      <p:cBhvr>
+                                        <p:cTn id="31" dur="1" fill="hold">
+                                          <p:stCondLst>
+                                            <p:cond delay="0"/>
+                                          </p:stCondLst>
+                                        </p:cTn>
+                                        <p:tgtEl>
+                                          <p:spTgt spid="8"/>
+                                        </p:tgtEl>
+                                        <p:attrNameLst>
+                                          <p:attrName>style.visibility</p:attrName>
+                                        </p:attrNameLst>
+                                      </p:cBhvr>
+                                      <p:to>
+                                        <p:strVal val="visible"/>
+                                      </p:to>
+                                    </p:set>
+                                    <p:animEffect transition="in" filter="fade">
+                                      <p:cBhvr>
+                                        <p:cTn id="32" dur="500"/>
+                                        <p:tgtEl>
+                                          <p:spTgt spid="8"/>
+                                        </p:tgtEl>
+                                      </p:cBhvr>
+                                    </p:animEffect>
+                                  </p:childTnLst>
+                                </p:cTn>
+                              </p:par>
+                            </p:childTnLst>
+                          </p:cTn>
+                        </p:par>
+                      </p:childTnLst>
+                    </p:cTn>
+                  </p:par>
+                  <p:par>
+                    <p:cTn id="33" fill="hold">
+                      <p:stCondLst>
+                        <p:cond delay="indefinite"/>
+                      </p:stCondLst>
+                      <p:childTnLst>
+                        <p:par>
+                          <p:cTn id="34" fill="hold">
+                            <p:stCondLst>
+                              <p:cond delay="0"/>
+                            </p:stCondLst>
+                            <p:childTnLst>
+                              <p:par>
+                                <p:cTn id="35" presetID="10" presetClass="entr" presetSubtype="0" fill="hold" nodeType="clickEffect">
+                                  <p:stCondLst>
+                                    <p:cond delay="0"/>
+                                  </p:stCondLst>
+                                  <p:childTnLst>
+                                    <p:set>
+                                      <p:cBhvr>
+                                        <p:cTn id="36" dur="1" fill="hold">
+                                          <p:stCondLst>
+                                            <p:cond delay="0"/>
+                                          </p:stCondLst>
+                                        </p:cTn>
+                                        <p:tgtEl>
+                                          <p:spTgt spid="11"/>
+                                        </p:tgtEl>
+                                        <p:attrNameLst>
+                                          <p:attrName>style.visibility</p:attrName>
+                                        </p:attrNameLst>
+                                      </p:cBhvr>
+                                      <p:to>
+                                        <p:strVal val="visible"/>
+                                      </p:to>
+                                    </p:set>
+                                    <p:animEffect transition="in" filter="fade">
+                                      <p:cBhvr>
+                                        <p:cTn id="37" dur="500"/>
+                                        <p:tgtEl>
+                                          <p:spTgt spid="11"/>
+                                        </p:tgtEl>
+                                      </p:cBhvr>
+                                    </p:animEffect>
+                                  </p:childTnLst>
+                                </p:cTn>
+                              </p:par>
+                            </p:childTnLst>
+                          </p:cTn>
+                        </p:par>
+                      </p:childTnLst>
+                    </p:cTn>
+                  </p:par>
+                  <p:par>
+                    <p:cTn id="38" fill="hold">
+                      <p:stCondLst>
+                        <p:cond delay="indefinite"/>
+                      </p:stCondLst>
+                      <p:childTnLst>
+                        <p:par>
+                          <p:cTn id="39" fill="hold">
+                            <p:stCondLst>
+                              <p:cond delay="0"/>
+                            </p:stCondLst>
+                            <p:childTnLst>
+                              <p:par>
+                                <p:cTn id="40" presetID="10" presetClass="entr" presetSubtype="0" fill="hold" nodeType="clickEffect">
+                                  <p:stCondLst>
+                                    <p:cond delay="0"/>
+                                  </p:stCondLst>
+                                  <p:childTnLst>
+                                    <p:set>
+                                      <p:cBhvr>
+                                        <p:cTn id="41" dur="1" fill="hold">
+                                          <p:stCondLst>
+                                            <p:cond delay="0"/>
+                                          </p:stCondLst>
+                                        </p:cTn>
+                                        <p:tgtEl>
+                                          <p:spTgt spid="12"/>
+                                        </p:tgtEl>
+                                        <p:attrNameLst>
+                                          <p:attrName>style.visibility</p:attrName>
+                                        </p:attrNameLst>
+                                      </p:cBhvr>
+                                      <p:to>
+                                        <p:strVal val="visible"/>
+                                      </p:to>
+                                    </p:set>
+                                    <p:animEffect transition="in" filter="fade">
+                                      <p:cBhvr>
+                                        <p:cTn id="42" dur="500"/>
+                                        <p:tgtEl>
+                                          <p:spTgt spid="12"/>
+                                        </p:tgtEl>
+                                      </p:cBhvr>
+                                    </p:animEffect>
+                                  </p:childTnLst>
+                                </p:cTn>
+                              </p:par>
+                            </p:childTnLst>
+                          </p:cTn>
+                        </p:par>
+                      </p:childTnLst>
+                    </p:cTn>
+                  </p:par>
+                </p:childTnLst>
+              </p:cTn>
+              <p:prevCondLst>
+                <p:cond evt="onPrev" delay="0">
+                  <p:tgtEl>
+                    <p:sldTgt/>
+                  </p:tgtEl>
+                </p:cond>
+              </p:prevCondLst>
+              <p:nextCondLst>
+                <p:cond evt="onNext" delay="0">
+                  <p:tgtEl>
+                    <p:sldTgt/>
+                  </p:tgtEl>
+                </p:cond>
+              </p:nextCondLst>
+            </p:seq>
+          </p:childTnLst>
+        </p:cTn>
       </p:par>
     </p:tnLst>
+    <p:bldLst>
+      <p:bldP spid="4" grpId="0"/>
+      <p:bldP spid="5" grpId="0"/>
+      <p:bldP spid="8" grpId="0"/>
+    </p:bldLst>
   </p:timing>
 </p:sld>
 </file>
@@ -14576,7 +16546,7 @@
   <a:extraClrSchemeLst/>
   <a:extLst>
     <a:ext uri="{05A4C25C-085E-4340-85A3-A5531E510DB2}">
-      <thm15:themeFamily xmlns:thm15="http://schemas.microsoft.com/office/thememl/2012/main" name="Circuit" id="{0AC2F7E7-15F5-431C-B2A2-456FE929F56C}" vid="{0911B802-464C-4241-8DD9-B60FF88E379F}"/>
+      <thm15:themeFamily xmlns:thm15="http://schemas.microsoft.com/office/thememl/2012/main" xmlns="" name="Circuit" id="{0AC2F7E7-15F5-431C-B2A2-456FE929F56C}" vid="{0911B802-464C-4241-8DD9-B60FF88E379F}"/>
     </a:ext>
   </a:extLst>
 </a:theme>

</xml_diff>